<commit_message>
pressure layer on sst added and bib updated
</commit_message>
<xml_diff>
--- a/prep/communication/OHI Hawaii display.pptx
+++ b/prep/communication/OHI Hawaii display.pptx
@@ -5,10 +5,11 @@
     <p:sldMasterId id="2147483648" r:id="rId1"/>
   </p:sldMasterIdLst>
   <p:notesMasterIdLst>
-    <p:notesMasterId r:id="rId3"/>
+    <p:notesMasterId r:id="rId4"/>
   </p:notesMasterIdLst>
   <p:sldIdLst>
     <p:sldId id="256" r:id="rId2"/>
+    <p:sldId id="257" r:id="rId3"/>
   </p:sldIdLst>
   <p:sldSz cx="12192000" cy="6858000"/>
   <p:notesSz cx="6858000" cy="9144000"/>
@@ -107,6 +108,11 @@
       </a:defRPr>
     </a:lvl9pPr>
   </p:defaultTextStyle>
+  <p:extLst>
+    <p:ext uri="{EFAFB233-063F-42B5-8137-9DF3F51BA10A}">
+      <p15:sldGuideLst xmlns:p15="http://schemas.microsoft.com/office/powerpoint/2012/main"/>
+    </p:ext>
+  </p:extLst>
 </p:presentation>
 </file>
 
@@ -192,7 +198,7 @@
           <a:p>
             <a:fld id="{054DC7BA-00C6-B54E-AEB8-EED7F5C597E3}" type="datetimeFigureOut">
               <a:rPr lang="en-US" smtClean="0"/>
-              <a:t>1/24/18</a:t>
+              <a:t>1/31/18</a:t>
             </a:fld>
             <a:endParaRPr lang="en-US"/>
           </a:p>
@@ -591,7 +597,7 @@
           <a:p>
             <a:fld id="{FCC199DD-CF64-0C46-A13D-CD4B37BC04CF}" type="datetimeFigureOut">
               <a:rPr lang="en-US" smtClean="0"/>
-              <a:t>1/24/18</a:t>
+              <a:t>1/31/18</a:t>
             </a:fld>
             <a:endParaRPr lang="en-US"/>
           </a:p>
@@ -761,7 +767,7 @@
           <a:p>
             <a:fld id="{FCC199DD-CF64-0C46-A13D-CD4B37BC04CF}" type="datetimeFigureOut">
               <a:rPr lang="en-US" smtClean="0"/>
-              <a:t>1/24/18</a:t>
+              <a:t>1/31/18</a:t>
             </a:fld>
             <a:endParaRPr lang="en-US"/>
           </a:p>
@@ -941,7 +947,7 @@
           <a:p>
             <a:fld id="{FCC199DD-CF64-0C46-A13D-CD4B37BC04CF}" type="datetimeFigureOut">
               <a:rPr lang="en-US" smtClean="0"/>
-              <a:t>1/24/18</a:t>
+              <a:t>1/31/18</a:t>
             </a:fld>
             <a:endParaRPr lang="en-US"/>
           </a:p>
@@ -1111,7 +1117,7 @@
           <a:p>
             <a:fld id="{FCC199DD-CF64-0C46-A13D-CD4B37BC04CF}" type="datetimeFigureOut">
               <a:rPr lang="en-US" smtClean="0"/>
-              <a:t>1/24/18</a:t>
+              <a:t>1/31/18</a:t>
             </a:fld>
             <a:endParaRPr lang="en-US"/>
           </a:p>
@@ -1357,7 +1363,7 @@
           <a:p>
             <a:fld id="{FCC199DD-CF64-0C46-A13D-CD4B37BC04CF}" type="datetimeFigureOut">
               <a:rPr lang="en-US" smtClean="0"/>
-              <a:t>1/24/18</a:t>
+              <a:t>1/31/18</a:t>
             </a:fld>
             <a:endParaRPr lang="en-US"/>
           </a:p>
@@ -1589,7 +1595,7 @@
           <a:p>
             <a:fld id="{FCC199DD-CF64-0C46-A13D-CD4B37BC04CF}" type="datetimeFigureOut">
               <a:rPr lang="en-US" smtClean="0"/>
-              <a:t>1/24/18</a:t>
+              <a:t>1/31/18</a:t>
             </a:fld>
             <a:endParaRPr lang="en-US"/>
           </a:p>
@@ -1956,7 +1962,7 @@
           <a:p>
             <a:fld id="{FCC199DD-CF64-0C46-A13D-CD4B37BC04CF}" type="datetimeFigureOut">
               <a:rPr lang="en-US" smtClean="0"/>
-              <a:t>1/24/18</a:t>
+              <a:t>1/31/18</a:t>
             </a:fld>
             <a:endParaRPr lang="en-US"/>
           </a:p>
@@ -2074,7 +2080,7 @@
           <a:p>
             <a:fld id="{FCC199DD-CF64-0C46-A13D-CD4B37BC04CF}" type="datetimeFigureOut">
               <a:rPr lang="en-US" smtClean="0"/>
-              <a:t>1/24/18</a:t>
+              <a:t>1/31/18</a:t>
             </a:fld>
             <a:endParaRPr lang="en-US"/>
           </a:p>
@@ -2169,7 +2175,7 @@
           <a:p>
             <a:fld id="{FCC199DD-CF64-0C46-A13D-CD4B37BC04CF}" type="datetimeFigureOut">
               <a:rPr lang="en-US" smtClean="0"/>
-              <a:t>1/24/18</a:t>
+              <a:t>1/31/18</a:t>
             </a:fld>
             <a:endParaRPr lang="en-US"/>
           </a:p>
@@ -2446,7 +2452,7 @@
           <a:p>
             <a:fld id="{FCC199DD-CF64-0C46-A13D-CD4B37BC04CF}" type="datetimeFigureOut">
               <a:rPr lang="en-US" smtClean="0"/>
-              <a:t>1/24/18</a:t>
+              <a:t>1/31/18</a:t>
             </a:fld>
             <a:endParaRPr lang="en-US"/>
           </a:p>
@@ -2699,7 +2705,7 @@
           <a:p>
             <a:fld id="{FCC199DD-CF64-0C46-A13D-CD4B37BC04CF}" type="datetimeFigureOut">
               <a:rPr lang="en-US" smtClean="0"/>
-              <a:t>1/24/18</a:t>
+              <a:t>1/31/18</a:t>
             </a:fld>
             <a:endParaRPr lang="en-US"/>
           </a:p>
@@ -2912,7 +2918,7 @@
           <a:p>
             <a:fld id="{FCC199DD-CF64-0C46-A13D-CD4B37BC04CF}" type="datetimeFigureOut">
               <a:rPr lang="en-US" smtClean="0"/>
-              <a:t>1/24/18</a:t>
+              <a:t>1/31/18</a:t>
             </a:fld>
             <a:endParaRPr lang="en-US"/>
           </a:p>
@@ -3791,6 +3797,424 @@
 </p:sld>
 </file>
 
+<file path=ppt/slides/slide2.xml><?xml version="1.0" encoding="utf-8"?>
+<p:sld xmlns:a="http://schemas.openxmlformats.org/drawingml/2006/main" xmlns:r="http://schemas.openxmlformats.org/officeDocument/2006/relationships" xmlns:p="http://schemas.openxmlformats.org/presentationml/2006/main">
+  <p:cSld>
+    <p:spTree>
+      <p:nvGrpSpPr>
+        <p:cNvPr id="1" name=""/>
+        <p:cNvGrpSpPr/>
+        <p:nvPr/>
+      </p:nvGrpSpPr>
+      <p:grpSpPr>
+        <a:xfrm>
+          <a:off x="0" y="0"/>
+          <a:ext cx="0" cy="0"/>
+          <a:chOff x="0" y="0"/>
+          <a:chExt cx="0" cy="0"/>
+        </a:xfrm>
+      </p:grpSpPr>
+      <p:grpSp>
+        <p:nvGrpSpPr>
+          <p:cNvPr id="9" name="Group 8"/>
+          <p:cNvGrpSpPr/>
+          <p:nvPr/>
+        </p:nvGrpSpPr>
+        <p:grpSpPr>
+          <a:xfrm>
+            <a:off x="819787" y="562918"/>
+            <a:ext cx="7757829" cy="1391748"/>
+            <a:chOff x="819787" y="562918"/>
+            <a:chExt cx="7757829" cy="1391748"/>
+          </a:xfrm>
+        </p:grpSpPr>
+        <p:pic>
+          <p:nvPicPr>
+            <p:cNvPr id="2" name="Picture 2" descr="ub"/>
+            <p:cNvPicPr>
+              <a:picLocks noChangeAspect="1" noChangeArrowheads="1"/>
+            </p:cNvPicPr>
+            <p:nvPr/>
+          </p:nvPicPr>
+          <p:blipFill rotWithShape="1">
+            <a:blip r:embed="rId2">
+              <a:extLst>
+                <a:ext uri="{28A0092B-C50C-407E-A947-70E740481C1C}">
+                  <a14:useLocalDpi xmlns:a14="http://schemas.microsoft.com/office/drawing/2010/main" val="0"/>
+                </a:ext>
+              </a:extLst>
+            </a:blip>
+            <a:srcRect l="27576" t="192" r="56413" b="51669"/>
+            <a:stretch/>
+          </p:blipFill>
+          <p:spPr bwMode="auto">
+            <a:xfrm>
+              <a:off x="819787" y="567411"/>
+              <a:ext cx="1311007" cy="1266940"/>
+            </a:xfrm>
+            <a:prstGeom prst="rect">
+              <a:avLst/>
+            </a:prstGeom>
+            <a:noFill/>
+            <a:extLst>
+              <a:ext uri="{909E8E84-426E-40DD-AFC4-6F175D3DCCD1}">
+                <a14:hiddenFill xmlns:a14="http://schemas.microsoft.com/office/drawing/2010/main">
+                  <a:solidFill>
+                    <a:srgbClr val="FFFFFF"/>
+                  </a:solidFill>
+                </a14:hiddenFill>
+              </a:ext>
+            </a:extLst>
+          </p:spPr>
+        </p:pic>
+        <p:pic>
+          <p:nvPicPr>
+            <p:cNvPr id="3" name="Picture 2" descr="ub"/>
+            <p:cNvPicPr>
+              <a:picLocks noChangeAspect="1" noChangeArrowheads="1"/>
+            </p:cNvPicPr>
+            <p:nvPr/>
+          </p:nvPicPr>
+          <p:blipFill rotWithShape="1">
+            <a:blip r:embed="rId2">
+              <a:extLst>
+                <a:ext uri="{28A0092B-C50C-407E-A947-70E740481C1C}">
+                  <a14:useLocalDpi xmlns:a14="http://schemas.microsoft.com/office/drawing/2010/main" val="0"/>
+                </a:ext>
+              </a:extLst>
+            </a:blip>
+            <a:srcRect l="42189" r="42607" b="51604"/>
+            <a:stretch/>
+          </p:blipFill>
+          <p:spPr bwMode="auto">
+            <a:xfrm>
+              <a:off x="5201260" y="562918"/>
+              <a:ext cx="1244905" cy="1273741"/>
+            </a:xfrm>
+            <a:prstGeom prst="rect">
+              <a:avLst/>
+            </a:prstGeom>
+            <a:noFill/>
+            <a:extLst>
+              <a:ext uri="{909E8E84-426E-40DD-AFC4-6F175D3DCCD1}">
+                <a14:hiddenFill xmlns:a14="http://schemas.microsoft.com/office/drawing/2010/main">
+                  <a:solidFill>
+                    <a:srgbClr val="FFFFFF"/>
+                  </a:solidFill>
+                </a14:hiddenFill>
+              </a:ext>
+            </a:extLst>
+          </p:spPr>
+        </p:pic>
+        <p:pic>
+          <p:nvPicPr>
+            <p:cNvPr id="4" name="Picture 2" descr="ub"/>
+            <p:cNvPicPr>
+              <a:picLocks noChangeAspect="1" noChangeArrowheads="1"/>
+            </p:cNvPicPr>
+            <p:nvPr/>
+          </p:nvPicPr>
+          <p:blipFill rotWithShape="1">
+            <a:blip r:embed="rId2">
+              <a:extLst>
+                <a:ext uri="{28A0092B-C50C-407E-A947-70E740481C1C}">
+                  <a14:useLocalDpi xmlns:a14="http://schemas.microsoft.com/office/drawing/2010/main" val="0"/>
+                </a:ext>
+              </a:extLst>
+            </a:blip>
+            <a:srcRect l="28801" t="48956" r="57879"/>
+            <a:stretch/>
+          </p:blipFill>
+          <p:spPr bwMode="auto">
+            <a:xfrm>
+              <a:off x="3073708" y="611221"/>
+              <a:ext cx="1090671" cy="1343445"/>
+            </a:xfrm>
+            <a:prstGeom prst="rect">
+              <a:avLst/>
+            </a:prstGeom>
+            <a:noFill/>
+            <a:extLst>
+              <a:ext uri="{909E8E84-426E-40DD-AFC4-6F175D3DCCD1}">
+                <a14:hiddenFill xmlns:a14="http://schemas.microsoft.com/office/drawing/2010/main">
+                  <a:solidFill>
+                    <a:srgbClr val="FFFFFF"/>
+                  </a:solidFill>
+                </a14:hiddenFill>
+              </a:ext>
+            </a:extLst>
+          </p:spPr>
+        </p:pic>
+        <p:pic>
+          <p:nvPicPr>
+            <p:cNvPr id="5" name="Picture 2" descr="ub"/>
+            <p:cNvPicPr>
+              <a:picLocks noChangeAspect="1" noChangeArrowheads="1"/>
+            </p:cNvPicPr>
+            <p:nvPr/>
+          </p:nvPicPr>
+          <p:blipFill rotWithShape="1">
+            <a:blip r:embed="rId2">
+              <a:extLst>
+                <a:ext uri="{28A0092B-C50C-407E-A947-70E740481C1C}">
+                  <a14:useLocalDpi xmlns:a14="http://schemas.microsoft.com/office/drawing/2010/main" val="0"/>
+                </a:ext>
+              </a:extLst>
+            </a:blip>
+            <a:srcRect l="14204" t="46635" r="70714" b="3859"/>
+            <a:stretch/>
+          </p:blipFill>
+          <p:spPr bwMode="auto">
+            <a:xfrm>
+              <a:off x="7342678" y="598758"/>
+              <a:ext cx="1234938" cy="1302964"/>
+            </a:xfrm>
+            <a:prstGeom prst="rect">
+              <a:avLst/>
+            </a:prstGeom>
+            <a:noFill/>
+            <a:extLst>
+              <a:ext uri="{909E8E84-426E-40DD-AFC4-6F175D3DCCD1}">
+                <a14:hiddenFill xmlns:a14="http://schemas.microsoft.com/office/drawing/2010/main">
+                  <a:solidFill>
+                    <a:srgbClr val="FFFFFF"/>
+                  </a:solidFill>
+                </a14:hiddenFill>
+              </a:ext>
+            </a:extLst>
+          </p:spPr>
+        </p:pic>
+        <p:pic>
+          <p:nvPicPr>
+            <p:cNvPr id="6" name="Picture 2" descr="ub"/>
+            <p:cNvPicPr>
+              <a:picLocks noChangeAspect="1" noChangeArrowheads="1"/>
+            </p:cNvPicPr>
+            <p:nvPr/>
+          </p:nvPicPr>
+          <p:blipFill rotWithShape="1">
+            <a:blip r:embed="rId2">
+              <a:extLst>
+                <a:ext uri="{28A0092B-C50C-407E-A947-70E740481C1C}">
+                  <a14:useLocalDpi xmlns:a14="http://schemas.microsoft.com/office/drawing/2010/main" val="0"/>
+                </a:ext>
+              </a:extLst>
+            </a:blip>
+            <a:srcRect l="70653" t="667" r="15489" b="50334"/>
+            <a:stretch/>
+          </p:blipFill>
+          <p:spPr bwMode="auto">
+            <a:xfrm>
+              <a:off x="4110589" y="566836"/>
+              <a:ext cx="1134737" cy="1289604"/>
+            </a:xfrm>
+            <a:prstGeom prst="rect">
+              <a:avLst/>
+            </a:prstGeom>
+            <a:noFill/>
+            <a:extLst>
+              <a:ext uri="{909E8E84-426E-40DD-AFC4-6F175D3DCCD1}">
+                <a14:hiddenFill xmlns:a14="http://schemas.microsoft.com/office/drawing/2010/main">
+                  <a:solidFill>
+                    <a:srgbClr val="FFFFFF"/>
+                  </a:solidFill>
+                </a14:hiddenFill>
+              </a:ext>
+            </a:extLst>
+          </p:spPr>
+        </p:pic>
+        <p:pic>
+          <p:nvPicPr>
+            <p:cNvPr id="7" name="Picture 2" descr="ub"/>
+            <p:cNvPicPr>
+              <a:picLocks noChangeAspect="1" noChangeArrowheads="1"/>
+            </p:cNvPicPr>
+            <p:nvPr/>
+          </p:nvPicPr>
+          <p:blipFill rotWithShape="1">
+            <a:blip r:embed="rId2">
+              <a:extLst>
+                <a:ext uri="{28A0092B-C50C-407E-A947-70E740481C1C}">
+                  <a14:useLocalDpi xmlns:a14="http://schemas.microsoft.com/office/drawing/2010/main" val="0"/>
+                </a:ext>
+              </a:extLst>
+            </a:blip>
+            <a:srcRect l="57759" t="48074" r="27845" b="2893"/>
+            <a:stretch/>
+          </p:blipFill>
+          <p:spPr bwMode="auto">
+            <a:xfrm>
+              <a:off x="6335997" y="611221"/>
+              <a:ext cx="1178805" cy="1290501"/>
+            </a:xfrm>
+            <a:prstGeom prst="rect">
+              <a:avLst/>
+            </a:prstGeom>
+            <a:noFill/>
+            <a:extLst>
+              <a:ext uri="{909E8E84-426E-40DD-AFC4-6F175D3DCCD1}">
+                <a14:hiddenFill xmlns:a14="http://schemas.microsoft.com/office/drawing/2010/main">
+                  <a:solidFill>
+                    <a:srgbClr val="FFFFFF"/>
+                  </a:solidFill>
+                </a14:hiddenFill>
+              </a:ext>
+            </a:extLst>
+          </p:spPr>
+        </p:pic>
+        <p:pic>
+          <p:nvPicPr>
+            <p:cNvPr id="8" name="Picture 2" descr="ub"/>
+            <p:cNvPicPr>
+              <a:picLocks noChangeAspect="1" noChangeArrowheads="1"/>
+            </p:cNvPicPr>
+            <p:nvPr/>
+          </p:nvPicPr>
+          <p:blipFill rotWithShape="1">
+            <a:blip r:embed="rId2">
+              <a:extLst>
+                <a:ext uri="{28A0092B-C50C-407E-A947-70E740481C1C}">
+                  <a14:useLocalDpi xmlns:a14="http://schemas.microsoft.com/office/drawing/2010/main" val="0"/>
+                </a:ext>
+              </a:extLst>
+            </a:blip>
+            <a:srcRect l="43385" t="47915" r="41815" b="7277"/>
+            <a:stretch/>
+          </p:blipFill>
+          <p:spPr bwMode="auto">
+            <a:xfrm>
+              <a:off x="1990944" y="611221"/>
+              <a:ext cx="1211855" cy="1179319"/>
+            </a:xfrm>
+            <a:prstGeom prst="rect">
+              <a:avLst/>
+            </a:prstGeom>
+            <a:noFill/>
+            <a:extLst>
+              <a:ext uri="{909E8E84-426E-40DD-AFC4-6F175D3DCCD1}">
+                <a14:hiddenFill xmlns:a14="http://schemas.microsoft.com/office/drawing/2010/main">
+                  <a:solidFill>
+                    <a:srgbClr val="FFFFFF"/>
+                  </a:solidFill>
+                </a14:hiddenFill>
+              </a:ext>
+            </a:extLst>
+          </p:spPr>
+        </p:pic>
+      </p:grpSp>
+      <p:grpSp>
+        <p:nvGrpSpPr>
+          <p:cNvPr id="12" name="Group 11"/>
+          <p:cNvGrpSpPr/>
+          <p:nvPr/>
+        </p:nvGrpSpPr>
+        <p:grpSpPr>
+          <a:xfrm>
+            <a:off x="-24936" y="757472"/>
+            <a:ext cx="825799" cy="815041"/>
+            <a:chOff x="-24935" y="611221"/>
+            <a:chExt cx="973980" cy="961292"/>
+          </a:xfrm>
+        </p:grpSpPr>
+        <p:sp>
+          <p:nvSpPr>
+            <p:cNvPr id="10" name="Oval 9"/>
+            <p:cNvSpPr/>
+            <p:nvPr/>
+          </p:nvSpPr>
+          <p:spPr>
+            <a:xfrm>
+              <a:off x="-24935" y="611221"/>
+              <a:ext cx="961292" cy="961292"/>
+            </a:xfrm>
+            <a:prstGeom prst="ellipse">
+              <a:avLst/>
+            </a:prstGeom>
+            <a:ln>
+              <a:noFill/>
+            </a:ln>
+          </p:spPr>
+          <p:style>
+            <a:lnRef idx="2">
+              <a:schemeClr val="accent1">
+                <a:shade val="50000"/>
+              </a:schemeClr>
+            </a:lnRef>
+            <a:fillRef idx="1">
+              <a:schemeClr val="accent1"/>
+            </a:fillRef>
+            <a:effectRef idx="0">
+              <a:schemeClr val="accent1"/>
+            </a:effectRef>
+            <a:fontRef idx="minor">
+              <a:schemeClr val="lt1"/>
+            </a:fontRef>
+          </p:style>
+          <p:txBody>
+            <a:bodyPr rtlCol="0" anchor="ctr"/>
+            <a:lstStyle/>
+            <a:p>
+              <a:pPr algn="ctr"/>
+              <a:endParaRPr lang="en-US" sz="1400"/>
+            </a:p>
+          </p:txBody>
+        </p:sp>
+        <p:sp>
+          <p:nvSpPr>
+            <p:cNvPr id="11" name="TextBox 10"/>
+            <p:cNvSpPr txBox="1"/>
+            <p:nvPr/>
+          </p:nvSpPr>
+          <p:spPr>
+            <a:xfrm>
+              <a:off x="-12247" y="767510"/>
+              <a:ext cx="961292" cy="584775"/>
+            </a:xfrm>
+            <a:prstGeom prst="rect">
+              <a:avLst/>
+            </a:prstGeom>
+            <a:noFill/>
+            <a:ln>
+              <a:noFill/>
+            </a:ln>
+          </p:spPr>
+          <p:txBody>
+            <a:bodyPr wrap="square" rtlCol="0">
+              <a:spAutoFit/>
+            </a:bodyPr>
+            <a:lstStyle/>
+            <a:p>
+              <a:pPr algn="ctr"/>
+              <a:r>
+                <a:rPr lang="en-US" sz="3200" dirty="0" smtClean="0">
+                  <a:solidFill>
+                    <a:schemeClr val="bg1"/>
+                  </a:solidFill>
+                </a:rPr>
+                <a:t>87</a:t>
+              </a:r>
+              <a:endParaRPr lang="en-US" sz="3200" dirty="0">
+                <a:solidFill>
+                  <a:schemeClr val="bg1"/>
+                </a:solidFill>
+              </a:endParaRPr>
+            </a:p>
+          </p:txBody>
+        </p:sp>
+      </p:grpSp>
+    </p:spTree>
+    <p:extLst>
+      <p:ext uri="{BB962C8B-B14F-4D97-AF65-F5344CB8AC3E}">
+        <p14:creationId xmlns:p14="http://schemas.microsoft.com/office/powerpoint/2010/main" val="814447999"/>
+      </p:ext>
+    </p:extLst>
+  </p:cSld>
+  <p:clrMapOvr>
+    <a:masterClrMapping/>
+  </p:clrMapOvr>
+</p:sld>
+</file>
+
 <file path=ppt/theme/theme1.xml><?xml version="1.0" encoding="utf-8"?>
 <a:theme xmlns:a="http://schemas.openxmlformats.org/drawingml/2006/main" name="Office Theme">
   <a:themeElements>

</xml_diff>

<commit_message>
updated liv trend calculations and reran scores
</commit_message>
<xml_diff>
--- a/prep/communication/OHI Hawaii display.pptx
+++ b/prep/communication/OHI Hawaii display.pptx
@@ -5,12 +5,14 @@
     <p:sldMasterId id="2147483648" r:id="rId1"/>
   </p:sldMasterIdLst>
   <p:notesMasterIdLst>
-    <p:notesMasterId r:id="rId5"/>
+    <p:notesMasterId r:id="rId7"/>
   </p:notesMasterIdLst>
   <p:sldIdLst>
-    <p:sldId id="256" r:id="rId2"/>
-    <p:sldId id="257" r:id="rId3"/>
-    <p:sldId id="258" r:id="rId4"/>
+    <p:sldId id="259" r:id="rId2"/>
+    <p:sldId id="260" r:id="rId3"/>
+    <p:sldId id="256" r:id="rId4"/>
+    <p:sldId id="257" r:id="rId5"/>
+    <p:sldId id="258" r:id="rId6"/>
   </p:sldIdLst>
   <p:sldSz cx="12192000" cy="6858000"/>
   <p:notesSz cx="6858000" cy="9144000"/>
@@ -199,7 +201,7 @@
           <a:p>
             <a:fld id="{054DC7BA-00C6-B54E-AEB8-EED7F5C597E3}" type="datetimeFigureOut">
               <a:rPr lang="en-US" smtClean="0"/>
-              <a:t>2/16/18</a:t>
+              <a:t>3/6/18</a:t>
             </a:fld>
             <a:endParaRPr lang="en-US"/>
           </a:p>
@@ -263,38 +265,37 @@
           <a:p>
             <a:pPr lvl="0"/>
             <a:r>
-              <a:rPr lang="en-US" smtClean="0"/>
+              <a:rPr lang="en-US"/>
               <a:t>Click to edit Master text styles</a:t>
             </a:r>
           </a:p>
           <a:p>
             <a:pPr lvl="1"/>
             <a:r>
-              <a:rPr lang="en-US" smtClean="0"/>
+              <a:rPr lang="en-US"/>
               <a:t>Second level</a:t>
             </a:r>
           </a:p>
           <a:p>
             <a:pPr lvl="2"/>
             <a:r>
-              <a:rPr lang="en-US" smtClean="0"/>
+              <a:rPr lang="en-US"/>
               <a:t>Third level</a:t>
             </a:r>
           </a:p>
           <a:p>
             <a:pPr lvl="3"/>
             <a:r>
-              <a:rPr lang="en-US" smtClean="0"/>
+              <a:rPr lang="en-US"/>
               <a:t>Fourth level</a:t>
             </a:r>
           </a:p>
           <a:p>
             <a:pPr lvl="4"/>
             <a:r>
-              <a:rPr lang="en-US" smtClean="0"/>
+              <a:rPr lang="en-US"/>
               <a:t>Fifth level</a:t>
             </a:r>
-            <a:endParaRPr lang="en-US"/>
           </a:p>
         </p:txBody>
       </p:sp>
@@ -509,10 +510,9 @@
           </a:lstStyle>
           <a:p>
             <a:r>
-              <a:rPr lang="en-US" smtClean="0"/>
+              <a:rPr lang="en-US"/>
               <a:t>Click to edit Master title style</a:t>
             </a:r>
-            <a:endParaRPr lang="en-US"/>
           </a:p>
         </p:txBody>
       </p:sp>
@@ -574,10 +574,9 @@
           </a:lstStyle>
           <a:p>
             <a:r>
-              <a:rPr lang="en-US" smtClean="0"/>
+              <a:rPr lang="en-US"/>
               <a:t>Click to edit Master subtitle style</a:t>
             </a:r>
-            <a:endParaRPr lang="en-US"/>
           </a:p>
         </p:txBody>
       </p:sp>
@@ -598,7 +597,7 @@
           <a:p>
             <a:fld id="{FCC199DD-CF64-0C46-A13D-CD4B37BC04CF}" type="datetimeFigureOut">
               <a:rPr lang="en-US" smtClean="0"/>
-              <a:t>2/16/18</a:t>
+              <a:t>3/6/18</a:t>
             </a:fld>
             <a:endParaRPr lang="en-US"/>
           </a:p>
@@ -692,10 +691,9 @@
           <a:lstStyle/>
           <a:p>
             <a:r>
-              <a:rPr lang="en-US" smtClean="0"/>
+              <a:rPr lang="en-US"/>
               <a:t>Click to edit Master title style</a:t>
             </a:r>
-            <a:endParaRPr lang="en-US"/>
           </a:p>
         </p:txBody>
       </p:sp>
@@ -716,38 +714,37 @@
           <a:p>
             <a:pPr lvl="0"/>
             <a:r>
-              <a:rPr lang="en-US" smtClean="0"/>
+              <a:rPr lang="en-US"/>
               <a:t>Click to edit Master text styles</a:t>
             </a:r>
           </a:p>
           <a:p>
             <a:pPr lvl="1"/>
             <a:r>
-              <a:rPr lang="en-US" smtClean="0"/>
+              <a:rPr lang="en-US"/>
               <a:t>Second level</a:t>
             </a:r>
           </a:p>
           <a:p>
             <a:pPr lvl="2"/>
             <a:r>
-              <a:rPr lang="en-US" smtClean="0"/>
+              <a:rPr lang="en-US"/>
               <a:t>Third level</a:t>
             </a:r>
           </a:p>
           <a:p>
             <a:pPr lvl="3"/>
             <a:r>
-              <a:rPr lang="en-US" smtClean="0"/>
+              <a:rPr lang="en-US"/>
               <a:t>Fourth level</a:t>
             </a:r>
           </a:p>
           <a:p>
             <a:pPr lvl="4"/>
             <a:r>
-              <a:rPr lang="en-US" smtClean="0"/>
+              <a:rPr lang="en-US"/>
               <a:t>Fifth level</a:t>
             </a:r>
-            <a:endParaRPr lang="en-US"/>
           </a:p>
         </p:txBody>
       </p:sp>
@@ -768,7 +765,7 @@
           <a:p>
             <a:fld id="{FCC199DD-CF64-0C46-A13D-CD4B37BC04CF}" type="datetimeFigureOut">
               <a:rPr lang="en-US" smtClean="0"/>
-              <a:t>2/16/18</a:t>
+              <a:t>3/6/18</a:t>
             </a:fld>
             <a:endParaRPr lang="en-US"/>
           </a:p>
@@ -867,10 +864,9 @@
           <a:lstStyle/>
           <a:p>
             <a:r>
-              <a:rPr lang="en-US" smtClean="0"/>
+              <a:rPr lang="en-US"/>
               <a:t>Click to edit Master title style</a:t>
             </a:r>
-            <a:endParaRPr lang="en-US"/>
           </a:p>
         </p:txBody>
       </p:sp>
@@ -896,38 +892,37 @@
           <a:p>
             <a:pPr lvl="0"/>
             <a:r>
-              <a:rPr lang="en-US" smtClean="0"/>
+              <a:rPr lang="en-US"/>
               <a:t>Click to edit Master text styles</a:t>
             </a:r>
           </a:p>
           <a:p>
             <a:pPr lvl="1"/>
             <a:r>
-              <a:rPr lang="en-US" smtClean="0"/>
+              <a:rPr lang="en-US"/>
               <a:t>Second level</a:t>
             </a:r>
           </a:p>
           <a:p>
             <a:pPr lvl="2"/>
             <a:r>
-              <a:rPr lang="en-US" smtClean="0"/>
+              <a:rPr lang="en-US"/>
               <a:t>Third level</a:t>
             </a:r>
           </a:p>
           <a:p>
             <a:pPr lvl="3"/>
             <a:r>
-              <a:rPr lang="en-US" smtClean="0"/>
+              <a:rPr lang="en-US"/>
               <a:t>Fourth level</a:t>
             </a:r>
           </a:p>
           <a:p>
             <a:pPr lvl="4"/>
             <a:r>
-              <a:rPr lang="en-US" smtClean="0"/>
+              <a:rPr lang="en-US"/>
               <a:t>Fifth level</a:t>
             </a:r>
-            <a:endParaRPr lang="en-US"/>
           </a:p>
         </p:txBody>
       </p:sp>
@@ -948,7 +943,7 @@
           <a:p>
             <a:fld id="{FCC199DD-CF64-0C46-A13D-CD4B37BC04CF}" type="datetimeFigureOut">
               <a:rPr lang="en-US" smtClean="0"/>
-              <a:t>2/16/18</a:t>
+              <a:t>3/6/18</a:t>
             </a:fld>
             <a:endParaRPr lang="en-US"/>
           </a:p>
@@ -1042,10 +1037,9 @@
           <a:lstStyle/>
           <a:p>
             <a:r>
-              <a:rPr lang="en-US" smtClean="0"/>
+              <a:rPr lang="en-US"/>
               <a:t>Click to edit Master title style</a:t>
             </a:r>
-            <a:endParaRPr lang="en-US"/>
           </a:p>
         </p:txBody>
       </p:sp>
@@ -1066,38 +1060,37 @@
           <a:p>
             <a:pPr lvl="0"/>
             <a:r>
-              <a:rPr lang="en-US" smtClean="0"/>
+              <a:rPr lang="en-US"/>
               <a:t>Click to edit Master text styles</a:t>
             </a:r>
           </a:p>
           <a:p>
             <a:pPr lvl="1"/>
             <a:r>
-              <a:rPr lang="en-US" smtClean="0"/>
+              <a:rPr lang="en-US"/>
               <a:t>Second level</a:t>
             </a:r>
           </a:p>
           <a:p>
             <a:pPr lvl="2"/>
             <a:r>
-              <a:rPr lang="en-US" smtClean="0"/>
+              <a:rPr lang="en-US"/>
               <a:t>Third level</a:t>
             </a:r>
           </a:p>
           <a:p>
             <a:pPr lvl="3"/>
             <a:r>
-              <a:rPr lang="en-US" smtClean="0"/>
+              <a:rPr lang="en-US"/>
               <a:t>Fourth level</a:t>
             </a:r>
           </a:p>
           <a:p>
             <a:pPr lvl="4"/>
             <a:r>
-              <a:rPr lang="en-US" smtClean="0"/>
+              <a:rPr lang="en-US"/>
               <a:t>Fifth level</a:t>
             </a:r>
-            <a:endParaRPr lang="en-US"/>
           </a:p>
         </p:txBody>
       </p:sp>
@@ -1118,7 +1111,7 @@
           <a:p>
             <a:fld id="{FCC199DD-CF64-0C46-A13D-CD4B37BC04CF}" type="datetimeFigureOut">
               <a:rPr lang="en-US" smtClean="0"/>
-              <a:t>2/16/18</a:t>
+              <a:t>3/6/18</a:t>
             </a:fld>
             <a:endParaRPr lang="en-US"/>
           </a:p>
@@ -1221,10 +1214,9 @@
           </a:lstStyle>
           <a:p>
             <a:r>
-              <a:rPr lang="en-US" smtClean="0"/>
+              <a:rPr lang="en-US"/>
               <a:t>Click to edit Master title style</a:t>
             </a:r>
-            <a:endParaRPr lang="en-US"/>
           </a:p>
         </p:txBody>
       </p:sp>
@@ -1341,7 +1333,7 @@
           <a:p>
             <a:pPr lvl="0"/>
             <a:r>
-              <a:rPr lang="en-US" smtClean="0"/>
+              <a:rPr lang="en-US"/>
               <a:t>Click to edit Master text styles</a:t>
             </a:r>
           </a:p>
@@ -1364,7 +1356,7 @@
           <a:p>
             <a:fld id="{FCC199DD-CF64-0C46-A13D-CD4B37BC04CF}" type="datetimeFigureOut">
               <a:rPr lang="en-US" smtClean="0"/>
-              <a:t>2/16/18</a:t>
+              <a:t>3/6/18</a:t>
             </a:fld>
             <a:endParaRPr lang="en-US"/>
           </a:p>
@@ -1458,10 +1450,9 @@
           <a:lstStyle/>
           <a:p>
             <a:r>
-              <a:rPr lang="en-US" smtClean="0"/>
+              <a:rPr lang="en-US"/>
               <a:t>Click to edit Master title style</a:t>
             </a:r>
-            <a:endParaRPr lang="en-US"/>
           </a:p>
         </p:txBody>
       </p:sp>
@@ -1487,38 +1478,37 @@
           <a:p>
             <a:pPr lvl="0"/>
             <a:r>
-              <a:rPr lang="en-US" smtClean="0"/>
+              <a:rPr lang="en-US"/>
               <a:t>Click to edit Master text styles</a:t>
             </a:r>
           </a:p>
           <a:p>
             <a:pPr lvl="1"/>
             <a:r>
-              <a:rPr lang="en-US" smtClean="0"/>
+              <a:rPr lang="en-US"/>
               <a:t>Second level</a:t>
             </a:r>
           </a:p>
           <a:p>
             <a:pPr lvl="2"/>
             <a:r>
-              <a:rPr lang="en-US" smtClean="0"/>
+              <a:rPr lang="en-US"/>
               <a:t>Third level</a:t>
             </a:r>
           </a:p>
           <a:p>
             <a:pPr lvl="3"/>
             <a:r>
-              <a:rPr lang="en-US" smtClean="0"/>
+              <a:rPr lang="en-US"/>
               <a:t>Fourth level</a:t>
             </a:r>
           </a:p>
           <a:p>
             <a:pPr lvl="4"/>
             <a:r>
-              <a:rPr lang="en-US" smtClean="0"/>
+              <a:rPr lang="en-US"/>
               <a:t>Fifth level</a:t>
             </a:r>
-            <a:endParaRPr lang="en-US"/>
           </a:p>
         </p:txBody>
       </p:sp>
@@ -1544,38 +1534,37 @@
           <a:p>
             <a:pPr lvl="0"/>
             <a:r>
-              <a:rPr lang="en-US" smtClean="0"/>
+              <a:rPr lang="en-US"/>
               <a:t>Click to edit Master text styles</a:t>
             </a:r>
           </a:p>
           <a:p>
             <a:pPr lvl="1"/>
             <a:r>
-              <a:rPr lang="en-US" smtClean="0"/>
+              <a:rPr lang="en-US"/>
               <a:t>Second level</a:t>
             </a:r>
           </a:p>
           <a:p>
             <a:pPr lvl="2"/>
             <a:r>
-              <a:rPr lang="en-US" smtClean="0"/>
+              <a:rPr lang="en-US"/>
               <a:t>Third level</a:t>
             </a:r>
           </a:p>
           <a:p>
             <a:pPr lvl="3"/>
             <a:r>
-              <a:rPr lang="en-US" smtClean="0"/>
+              <a:rPr lang="en-US"/>
               <a:t>Fourth level</a:t>
             </a:r>
           </a:p>
           <a:p>
             <a:pPr lvl="4"/>
             <a:r>
-              <a:rPr lang="en-US" smtClean="0"/>
+              <a:rPr lang="en-US"/>
               <a:t>Fifth level</a:t>
             </a:r>
-            <a:endParaRPr lang="en-US"/>
           </a:p>
         </p:txBody>
       </p:sp>
@@ -1596,7 +1585,7 @@
           <a:p>
             <a:fld id="{FCC199DD-CF64-0C46-A13D-CD4B37BC04CF}" type="datetimeFigureOut">
               <a:rPr lang="en-US" smtClean="0"/>
-              <a:t>2/16/18</a:t>
+              <a:t>3/6/18</a:t>
             </a:fld>
             <a:endParaRPr lang="en-US"/>
           </a:p>
@@ -1695,10 +1684,9 @@
           <a:lstStyle/>
           <a:p>
             <a:r>
-              <a:rPr lang="en-US" smtClean="0"/>
+              <a:rPr lang="en-US"/>
               <a:t>Click to edit Master title style</a:t>
             </a:r>
-            <a:endParaRPr lang="en-US"/>
           </a:p>
         </p:txBody>
       </p:sp>
@@ -1761,7 +1749,7 @@
           <a:p>
             <a:pPr lvl="0"/>
             <a:r>
-              <a:rPr lang="en-US" smtClean="0"/>
+              <a:rPr lang="en-US"/>
               <a:t>Click to edit Master text styles</a:t>
             </a:r>
           </a:p>
@@ -1789,38 +1777,37 @@
           <a:p>
             <a:pPr lvl="0"/>
             <a:r>
-              <a:rPr lang="en-US" smtClean="0"/>
+              <a:rPr lang="en-US"/>
               <a:t>Click to edit Master text styles</a:t>
             </a:r>
           </a:p>
           <a:p>
             <a:pPr lvl="1"/>
             <a:r>
-              <a:rPr lang="en-US" smtClean="0"/>
+              <a:rPr lang="en-US"/>
               <a:t>Second level</a:t>
             </a:r>
           </a:p>
           <a:p>
             <a:pPr lvl="2"/>
             <a:r>
-              <a:rPr lang="en-US" smtClean="0"/>
+              <a:rPr lang="en-US"/>
               <a:t>Third level</a:t>
             </a:r>
           </a:p>
           <a:p>
             <a:pPr lvl="3"/>
             <a:r>
-              <a:rPr lang="en-US" smtClean="0"/>
+              <a:rPr lang="en-US"/>
               <a:t>Fourth level</a:t>
             </a:r>
           </a:p>
           <a:p>
             <a:pPr lvl="4"/>
             <a:r>
-              <a:rPr lang="en-US" smtClean="0"/>
+              <a:rPr lang="en-US"/>
               <a:t>Fifth level</a:t>
             </a:r>
-            <a:endParaRPr lang="en-US"/>
           </a:p>
         </p:txBody>
       </p:sp>
@@ -1883,7 +1870,7 @@
           <a:p>
             <a:pPr lvl="0"/>
             <a:r>
-              <a:rPr lang="en-US" smtClean="0"/>
+              <a:rPr lang="en-US"/>
               <a:t>Click to edit Master text styles</a:t>
             </a:r>
           </a:p>
@@ -1911,38 +1898,37 @@
           <a:p>
             <a:pPr lvl="0"/>
             <a:r>
-              <a:rPr lang="en-US" smtClean="0"/>
+              <a:rPr lang="en-US"/>
               <a:t>Click to edit Master text styles</a:t>
             </a:r>
           </a:p>
           <a:p>
             <a:pPr lvl="1"/>
             <a:r>
-              <a:rPr lang="en-US" smtClean="0"/>
+              <a:rPr lang="en-US"/>
               <a:t>Second level</a:t>
             </a:r>
           </a:p>
           <a:p>
             <a:pPr lvl="2"/>
             <a:r>
-              <a:rPr lang="en-US" smtClean="0"/>
+              <a:rPr lang="en-US"/>
               <a:t>Third level</a:t>
             </a:r>
           </a:p>
           <a:p>
             <a:pPr lvl="3"/>
             <a:r>
-              <a:rPr lang="en-US" smtClean="0"/>
+              <a:rPr lang="en-US"/>
               <a:t>Fourth level</a:t>
             </a:r>
           </a:p>
           <a:p>
             <a:pPr lvl="4"/>
             <a:r>
-              <a:rPr lang="en-US" smtClean="0"/>
+              <a:rPr lang="en-US"/>
               <a:t>Fifth level</a:t>
             </a:r>
-            <a:endParaRPr lang="en-US"/>
           </a:p>
         </p:txBody>
       </p:sp>
@@ -1963,7 +1949,7 @@
           <a:p>
             <a:fld id="{FCC199DD-CF64-0C46-A13D-CD4B37BC04CF}" type="datetimeFigureOut">
               <a:rPr lang="en-US" smtClean="0"/>
-              <a:t>2/16/18</a:t>
+              <a:t>3/6/18</a:t>
             </a:fld>
             <a:endParaRPr lang="en-US"/>
           </a:p>
@@ -2057,10 +2043,9 @@
           <a:lstStyle/>
           <a:p>
             <a:r>
-              <a:rPr lang="en-US" smtClean="0"/>
+              <a:rPr lang="en-US"/>
               <a:t>Click to edit Master title style</a:t>
             </a:r>
-            <a:endParaRPr lang="en-US"/>
           </a:p>
         </p:txBody>
       </p:sp>
@@ -2081,7 +2066,7 @@
           <a:p>
             <a:fld id="{FCC199DD-CF64-0C46-A13D-CD4B37BC04CF}" type="datetimeFigureOut">
               <a:rPr lang="en-US" smtClean="0"/>
-              <a:t>2/16/18</a:t>
+              <a:t>3/6/18</a:t>
             </a:fld>
             <a:endParaRPr lang="en-US"/>
           </a:p>
@@ -2176,7 +2161,7 @@
           <a:p>
             <a:fld id="{FCC199DD-CF64-0C46-A13D-CD4B37BC04CF}" type="datetimeFigureOut">
               <a:rPr lang="en-US" smtClean="0"/>
-              <a:t>2/16/18</a:t>
+              <a:t>3/6/18</a:t>
             </a:fld>
             <a:endParaRPr lang="en-US"/>
           </a:p>
@@ -2279,10 +2264,9 @@
           </a:lstStyle>
           <a:p>
             <a:r>
-              <a:rPr lang="en-US" smtClean="0"/>
+              <a:rPr lang="en-US"/>
               <a:t>Click to edit Master title style</a:t>
             </a:r>
-            <a:endParaRPr lang="en-US"/>
           </a:p>
         </p:txBody>
       </p:sp>
@@ -2336,38 +2320,37 @@
           <a:p>
             <a:pPr lvl="0"/>
             <a:r>
-              <a:rPr lang="en-US" smtClean="0"/>
+              <a:rPr lang="en-US"/>
               <a:t>Click to edit Master text styles</a:t>
             </a:r>
           </a:p>
           <a:p>
             <a:pPr lvl="1"/>
             <a:r>
-              <a:rPr lang="en-US" smtClean="0"/>
+              <a:rPr lang="en-US"/>
               <a:t>Second level</a:t>
             </a:r>
           </a:p>
           <a:p>
             <a:pPr lvl="2"/>
             <a:r>
-              <a:rPr lang="en-US" smtClean="0"/>
+              <a:rPr lang="en-US"/>
               <a:t>Third level</a:t>
             </a:r>
           </a:p>
           <a:p>
             <a:pPr lvl="3"/>
             <a:r>
-              <a:rPr lang="en-US" smtClean="0"/>
+              <a:rPr lang="en-US"/>
               <a:t>Fourth level</a:t>
             </a:r>
           </a:p>
           <a:p>
             <a:pPr lvl="4"/>
             <a:r>
-              <a:rPr lang="en-US" smtClean="0"/>
+              <a:rPr lang="en-US"/>
               <a:t>Fifth level</a:t>
             </a:r>
-            <a:endParaRPr lang="en-US"/>
           </a:p>
         </p:txBody>
       </p:sp>
@@ -2430,7 +2413,7 @@
           <a:p>
             <a:pPr lvl="0"/>
             <a:r>
-              <a:rPr lang="en-US" smtClean="0"/>
+              <a:rPr lang="en-US"/>
               <a:t>Click to edit Master text styles</a:t>
             </a:r>
           </a:p>
@@ -2453,7 +2436,7 @@
           <a:p>
             <a:fld id="{FCC199DD-CF64-0C46-A13D-CD4B37BC04CF}" type="datetimeFigureOut">
               <a:rPr lang="en-US" smtClean="0"/>
-              <a:t>2/16/18</a:t>
+              <a:t>3/6/18</a:t>
             </a:fld>
             <a:endParaRPr lang="en-US"/>
           </a:p>
@@ -2556,10 +2539,9 @@
           </a:lstStyle>
           <a:p>
             <a:r>
-              <a:rPr lang="en-US" smtClean="0"/>
+              <a:rPr lang="en-US"/>
               <a:t>Click to edit Master title style</a:t>
             </a:r>
-            <a:endParaRPr lang="en-US"/>
           </a:p>
         </p:txBody>
       </p:sp>
@@ -2683,7 +2665,7 @@
           <a:p>
             <a:pPr lvl="0"/>
             <a:r>
-              <a:rPr lang="en-US" smtClean="0"/>
+              <a:rPr lang="en-US"/>
               <a:t>Click to edit Master text styles</a:t>
             </a:r>
           </a:p>
@@ -2706,7 +2688,7 @@
           <a:p>
             <a:fld id="{FCC199DD-CF64-0C46-A13D-CD4B37BC04CF}" type="datetimeFigureOut">
               <a:rPr lang="en-US" smtClean="0"/>
-              <a:t>2/16/18</a:t>
+              <a:t>3/6/18</a:t>
             </a:fld>
             <a:endParaRPr lang="en-US"/>
           </a:p>
@@ -2815,10 +2797,9 @@
           <a:lstStyle/>
           <a:p>
             <a:r>
-              <a:rPr lang="en-US" smtClean="0"/>
+              <a:rPr lang="en-US"/>
               <a:t>Click to edit Master title style</a:t>
             </a:r>
-            <a:endParaRPr lang="en-US"/>
           </a:p>
         </p:txBody>
       </p:sp>
@@ -2849,38 +2830,37 @@
           <a:p>
             <a:pPr lvl="0"/>
             <a:r>
-              <a:rPr lang="en-US" smtClean="0"/>
+              <a:rPr lang="en-US"/>
               <a:t>Click to edit Master text styles</a:t>
             </a:r>
           </a:p>
           <a:p>
             <a:pPr lvl="1"/>
             <a:r>
-              <a:rPr lang="en-US" smtClean="0"/>
+              <a:rPr lang="en-US"/>
               <a:t>Second level</a:t>
             </a:r>
           </a:p>
           <a:p>
             <a:pPr lvl="2"/>
             <a:r>
-              <a:rPr lang="en-US" smtClean="0"/>
+              <a:rPr lang="en-US"/>
               <a:t>Third level</a:t>
             </a:r>
           </a:p>
           <a:p>
             <a:pPr lvl="3"/>
             <a:r>
-              <a:rPr lang="en-US" smtClean="0"/>
+              <a:rPr lang="en-US"/>
               <a:t>Fourth level</a:t>
             </a:r>
           </a:p>
           <a:p>
             <a:pPr lvl="4"/>
             <a:r>
-              <a:rPr lang="en-US" smtClean="0"/>
+              <a:rPr lang="en-US"/>
               <a:t>Fifth level</a:t>
             </a:r>
-            <a:endParaRPr lang="en-US"/>
           </a:p>
         </p:txBody>
       </p:sp>
@@ -2919,7 +2899,7 @@
           <a:p>
             <a:fld id="{FCC199DD-CF64-0C46-A13D-CD4B37BC04CF}" type="datetimeFigureOut">
               <a:rPr lang="en-US" smtClean="0"/>
-              <a:t>2/16/18</a:t>
+              <a:t>3/6/18</a:t>
             </a:fld>
             <a:endParaRPr lang="en-US"/>
           </a:p>
@@ -3324,467 +3304,715 @@
           <a:chExt cx="0" cy="0"/>
         </a:xfrm>
       </p:grpSpPr>
-      <p:grpSp>
-        <p:nvGrpSpPr>
-          <p:cNvPr id="17" name="Group 16"/>
-          <p:cNvGrpSpPr/>
-          <p:nvPr/>
-        </p:nvGrpSpPr>
-        <p:grpSpPr>
-          <a:xfrm>
-            <a:off x="31901" y="0"/>
-            <a:ext cx="10797680" cy="6775581"/>
-            <a:chOff x="31901" y="0"/>
-            <a:chExt cx="10797680" cy="6775581"/>
-          </a:xfrm>
-        </p:grpSpPr>
-        <p:pic>
-          <p:nvPicPr>
-            <p:cNvPr id="1026" name="Picture 2" descr="ub"/>
-            <p:cNvPicPr>
-              <a:picLocks noChangeAspect="1" noChangeArrowheads="1"/>
-            </p:cNvPicPr>
-            <p:nvPr/>
-          </p:nvPicPr>
-          <p:blipFill rotWithShape="1">
-            <a:blip r:embed="rId2">
-              <a:extLst>
-                <a:ext uri="{28A0092B-C50C-407E-A947-70E740481C1C}">
-                  <a14:useLocalDpi xmlns:a14="http://schemas.microsoft.com/office/drawing/2010/main" val="0"/>
-                </a:ext>
-              </a:extLst>
-            </a:blip>
-            <a:srcRect l="27576" t="192" r="56413" b="51669"/>
-            <a:stretch/>
-          </p:blipFill>
-          <p:spPr bwMode="auto">
-            <a:xfrm>
-              <a:off x="6037244" y="454420"/>
-              <a:ext cx="1311007" cy="1266940"/>
-            </a:xfrm>
-            <a:prstGeom prst="rect">
-              <a:avLst/>
-            </a:prstGeom>
-            <a:noFill/>
+    </p:spTree>
+    <p:extLst>
+      <p:ext uri="{BB962C8B-B14F-4D97-AF65-F5344CB8AC3E}">
+        <p14:creationId xmlns:p14="http://schemas.microsoft.com/office/powerpoint/2010/main" val="2470846705"/>
+      </p:ext>
+    </p:extLst>
+  </p:cSld>
+  <p:clrMapOvr>
+    <a:masterClrMapping/>
+  </p:clrMapOvr>
+</p:sld>
+</file>
+
+<file path=ppt/slides/slide2.xml><?xml version="1.0" encoding="utf-8"?>
+<p:sld xmlns:a="http://schemas.openxmlformats.org/drawingml/2006/main" xmlns:r="http://schemas.openxmlformats.org/officeDocument/2006/relationships" xmlns:p="http://schemas.openxmlformats.org/presentationml/2006/main">
+  <p:cSld>
+    <p:spTree>
+      <p:nvGrpSpPr>
+        <p:cNvPr id="1" name=""/>
+        <p:cNvGrpSpPr/>
+        <p:nvPr/>
+      </p:nvGrpSpPr>
+      <p:grpSpPr>
+        <a:xfrm>
+          <a:off x="0" y="0"/>
+          <a:ext cx="0" cy="0"/>
+          <a:chOff x="0" y="0"/>
+          <a:chExt cx="0" cy="0"/>
+        </a:xfrm>
+      </p:grpSpPr>
+      <p:sp>
+        <p:nvSpPr>
+          <p:cNvPr id="2" name="Title 1">
             <a:extLst>
-              <a:ext uri="{909E8E84-426E-40DD-AFC4-6F175D3DCCD1}">
-                <a14:hiddenFill xmlns:a14="http://schemas.microsoft.com/office/drawing/2010/main">
-                  <a:solidFill>
-                    <a:srgbClr val="FFFFFF"/>
-                  </a:solidFill>
-                </a14:hiddenFill>
+              <a:ext uri="{FF2B5EF4-FFF2-40B4-BE49-F238E27FC236}">
+                <a16:creationId xmlns:a16="http://schemas.microsoft.com/office/drawing/2014/main" id="{D2C6F485-4DB3-B743-9498-88A994B45BF0}"/>
               </a:ext>
             </a:extLst>
-          </p:spPr>
-        </p:pic>
-        <p:pic>
-          <p:nvPicPr>
-            <p:cNvPr id="5" name="Picture 2" descr="ub"/>
-            <p:cNvPicPr>
-              <a:picLocks noChangeAspect="1" noChangeArrowheads="1"/>
-            </p:cNvPicPr>
-            <p:nvPr/>
-          </p:nvPicPr>
-          <p:blipFill rotWithShape="1">
-            <a:blip r:embed="rId2">
-              <a:extLst>
-                <a:ext uri="{28A0092B-C50C-407E-A947-70E740481C1C}">
-                  <a14:useLocalDpi xmlns:a14="http://schemas.microsoft.com/office/drawing/2010/main" val="0"/>
-                </a:ext>
-              </a:extLst>
-            </a:blip>
-            <a:srcRect l="42189" r="42607" b="51604"/>
-            <a:stretch/>
-          </p:blipFill>
-          <p:spPr bwMode="auto">
-            <a:xfrm>
-              <a:off x="6103346" y="4770384"/>
-              <a:ext cx="1244905" cy="1273741"/>
-            </a:xfrm>
-            <a:prstGeom prst="rect">
-              <a:avLst/>
-            </a:prstGeom>
-            <a:noFill/>
+          </p:cNvPr>
+          <p:cNvSpPr>
+            <a:spLocks noGrp="1"/>
+          </p:cNvSpPr>
+          <p:nvPr>
+            <p:ph type="title"/>
+          </p:nvPr>
+        </p:nvSpPr>
+        <p:spPr/>
+        <p:txBody>
+          <a:bodyPr/>
+          <a:lstStyle/>
+          <a:p>
+            <a:endParaRPr lang="haw-US"/>
+          </a:p>
+        </p:txBody>
+      </p:sp>
+    </p:spTree>
+    <p:extLst>
+      <p:ext uri="{BB962C8B-B14F-4D97-AF65-F5344CB8AC3E}">
+        <p14:creationId xmlns:p14="http://schemas.microsoft.com/office/powerpoint/2010/main" val="1463345037"/>
+      </p:ext>
+    </p:extLst>
+  </p:cSld>
+  <p:clrMapOvr>
+    <a:masterClrMapping/>
+  </p:clrMapOvr>
+</p:sld>
+</file>
+
+<file path=ppt/slides/slide3.xml><?xml version="1.0" encoding="utf-8"?>
+<p:sld xmlns:a="http://schemas.openxmlformats.org/drawingml/2006/main" xmlns:r="http://schemas.openxmlformats.org/officeDocument/2006/relationships" xmlns:p="http://schemas.openxmlformats.org/presentationml/2006/main">
+  <p:cSld>
+    <p:spTree>
+      <p:nvGrpSpPr>
+        <p:cNvPr id="1" name=""/>
+        <p:cNvGrpSpPr/>
+        <p:nvPr/>
+      </p:nvGrpSpPr>
+      <p:grpSpPr>
+        <a:xfrm>
+          <a:off x="0" y="0"/>
+          <a:ext cx="0" cy="0"/>
+          <a:chOff x="0" y="0"/>
+          <a:chExt cx="0" cy="0"/>
+        </a:xfrm>
+      </p:grpSpPr>
+      <p:pic>
+        <p:nvPicPr>
+          <p:cNvPr id="13" name="Picture 12"/>
+          <p:cNvPicPr>
+            <a:picLocks noChangeAspect="1"/>
+          </p:cNvPicPr>
+          <p:nvPr/>
+        </p:nvPicPr>
+        <p:blipFill rotWithShape="1">
+          <a:blip r:embed="rId2">
             <a:extLst>
-              <a:ext uri="{909E8E84-426E-40DD-AFC4-6F175D3DCCD1}">
-                <a14:hiddenFill xmlns:a14="http://schemas.microsoft.com/office/drawing/2010/main">
-                  <a:solidFill>
-                    <a:srgbClr val="FFFFFF"/>
-                  </a:solidFill>
-                </a14:hiddenFill>
+              <a:ext uri="{28A0092B-C50C-407E-A947-70E740481C1C}">
+                <a14:useLocalDpi xmlns:a14="http://schemas.microsoft.com/office/drawing/2010/main" val="0"/>
               </a:ext>
             </a:extLst>
-          </p:spPr>
-        </p:pic>
-        <p:pic>
-          <p:nvPicPr>
-            <p:cNvPr id="7" name="Picture 2" descr="ub"/>
-            <p:cNvPicPr>
-              <a:picLocks noChangeAspect="1" noChangeArrowheads="1"/>
-            </p:cNvPicPr>
-            <p:nvPr/>
-          </p:nvPicPr>
-          <p:blipFill rotWithShape="1">
-            <a:blip r:embed="rId2">
-              <a:extLst>
-                <a:ext uri="{28A0092B-C50C-407E-A947-70E740481C1C}">
-                  <a14:useLocalDpi xmlns:a14="http://schemas.microsoft.com/office/drawing/2010/main" val="0"/>
-                </a:ext>
-              </a:extLst>
-            </a:blip>
-            <a:srcRect l="28801" t="48956" r="57879"/>
-            <a:stretch/>
-          </p:blipFill>
-          <p:spPr bwMode="auto">
-            <a:xfrm>
-              <a:off x="6103344" y="3257166"/>
-              <a:ext cx="1090671" cy="1343445"/>
-            </a:xfrm>
-            <a:prstGeom prst="rect">
-              <a:avLst/>
-            </a:prstGeom>
-            <a:noFill/>
+          </a:blip>
+          <a:srcRect l="79710" t="38064" r="10946" b="33971"/>
+          <a:stretch/>
+        </p:blipFill>
+        <p:spPr>
+          <a:xfrm>
+            <a:off x="520032" y="5200311"/>
+            <a:ext cx="738491" cy="1657689"/>
+          </a:xfrm>
+          <a:prstGeom prst="rect">
+            <a:avLst/>
+          </a:prstGeom>
+        </p:spPr>
+      </p:pic>
+      <p:sp>
+        <p:nvSpPr>
+          <p:cNvPr id="12" name="TextBox 11"/>
+          <p:cNvSpPr txBox="1"/>
+          <p:nvPr/>
+        </p:nvSpPr>
+        <p:spPr>
+          <a:xfrm>
+            <a:off x="1564781" y="5515925"/>
+            <a:ext cx="3679634" cy="1200329"/>
+          </a:xfrm>
+          <a:prstGeom prst="rect">
+            <a:avLst/>
+          </a:prstGeom>
+          <a:noFill/>
+        </p:spPr>
+        <p:txBody>
+          <a:bodyPr wrap="square" rtlCol="0">
+            <a:spAutoFit/>
+          </a:bodyPr>
+          <a:lstStyle/>
+          <a:p>
+            <a:r>
+              <a:rPr lang="en-US" dirty="0">
+                <a:latin typeface="Proxima Nova" panose="02000506030000020004" pitchFamily="2" charset="0"/>
+              </a:rPr>
+              <a:t>Scores are from 0 to 100 and reflect the ability of our ocean to provide sustainable benefits to Hawaii now and into the future</a:t>
+            </a:r>
+          </a:p>
+        </p:txBody>
+      </p:sp>
+      <p:sp>
+        <p:nvSpPr>
+          <p:cNvPr id="14" name="TextBox 13"/>
+          <p:cNvSpPr txBox="1"/>
+          <p:nvPr/>
+        </p:nvSpPr>
+        <p:spPr>
+          <a:xfrm>
+            <a:off x="7103230" y="967518"/>
+            <a:ext cx="1988543" cy="738664"/>
+          </a:xfrm>
+          <a:prstGeom prst="rect">
+            <a:avLst/>
+          </a:prstGeom>
+          <a:noFill/>
+        </p:spPr>
+        <p:txBody>
+          <a:bodyPr wrap="square" rtlCol="0">
+            <a:spAutoFit/>
+          </a:bodyPr>
+          <a:lstStyle/>
+          <a:p>
+            <a:r>
+              <a:rPr lang="en-US" sz="1400" dirty="0">
+                <a:latin typeface="Proxima Nova" panose="02000506030000020004" pitchFamily="2" charset="0"/>
+              </a:rPr>
+              <a:t>85 Wild Caught Fisheries </a:t>
+            </a:r>
+          </a:p>
+          <a:p>
+            <a:r>
+              <a:rPr lang="en-US" sz="1400" dirty="0">
+                <a:latin typeface="Proxima Nova" panose="02000506030000020004" pitchFamily="2" charset="0"/>
+              </a:rPr>
+              <a:t>51 Mariculture</a:t>
+            </a:r>
+          </a:p>
+        </p:txBody>
+      </p:sp>
+      <p:pic>
+        <p:nvPicPr>
+          <p:cNvPr id="3" name="Picture 2">
             <a:extLst>
-              <a:ext uri="{909E8E84-426E-40DD-AFC4-6F175D3DCCD1}">
-                <a14:hiddenFill xmlns:a14="http://schemas.microsoft.com/office/drawing/2010/main">
-                  <a:solidFill>
-                    <a:srgbClr val="FFFFFF"/>
-                  </a:solidFill>
-                </a14:hiddenFill>
+              <a:ext uri="{FF2B5EF4-FFF2-40B4-BE49-F238E27FC236}">
+                <a16:creationId xmlns:a16="http://schemas.microsoft.com/office/drawing/2014/main" id="{B7B38A1D-8317-254A-9803-EE92DC355100}"/>
               </a:ext>
             </a:extLst>
-          </p:spPr>
-        </p:pic>
-        <p:pic>
-          <p:nvPicPr>
-            <p:cNvPr id="8" name="Picture 2" descr="ub"/>
-            <p:cNvPicPr>
-              <a:picLocks noChangeAspect="1" noChangeArrowheads="1"/>
-            </p:cNvPicPr>
-            <p:nvPr/>
-          </p:nvPicPr>
-          <p:blipFill rotWithShape="1">
-            <a:blip r:embed="rId2">
-              <a:extLst>
-                <a:ext uri="{28A0092B-C50C-407E-A947-70E740481C1C}">
-                  <a14:useLocalDpi xmlns:a14="http://schemas.microsoft.com/office/drawing/2010/main" val="0"/>
-                </a:ext>
-              </a:extLst>
-            </a:blip>
-            <a:srcRect l="14204" t="46635" r="70714" b="3859"/>
-            <a:stretch/>
-          </p:blipFill>
-          <p:spPr bwMode="auto">
-            <a:xfrm>
-              <a:off x="9233574" y="1834351"/>
-              <a:ext cx="1234938" cy="1302964"/>
-            </a:xfrm>
-            <a:prstGeom prst="rect">
-              <a:avLst/>
-            </a:prstGeom>
-            <a:noFill/>
+          </p:cNvPr>
+          <p:cNvPicPr>
+            <a:picLocks noChangeAspect="1"/>
+          </p:cNvPicPr>
+          <p:nvPr/>
+        </p:nvPicPr>
+        <p:blipFill rotWithShape="1">
+          <a:blip r:embed="rId3"/>
+          <a:srcRect l="15109" t="11566" r="22986" b="10127"/>
+          <a:stretch/>
+        </p:blipFill>
+        <p:spPr>
+          <a:xfrm>
+            <a:off x="190682" y="145639"/>
+            <a:ext cx="5660571" cy="5370286"/>
+          </a:xfrm>
+          <a:prstGeom prst="rect">
+            <a:avLst/>
+          </a:prstGeom>
+        </p:spPr>
+      </p:pic>
+      <p:sp>
+        <p:nvSpPr>
+          <p:cNvPr id="18" name="TextBox 17">
             <a:extLst>
-              <a:ext uri="{909E8E84-426E-40DD-AFC4-6F175D3DCCD1}">
-                <a14:hiddenFill xmlns:a14="http://schemas.microsoft.com/office/drawing/2010/main">
-                  <a:solidFill>
-                    <a:srgbClr val="FFFFFF"/>
-                  </a:solidFill>
-                </a14:hiddenFill>
+              <a:ext uri="{FF2B5EF4-FFF2-40B4-BE49-F238E27FC236}">
+                <a16:creationId xmlns:a16="http://schemas.microsoft.com/office/drawing/2014/main" id="{1CEE63A2-11B2-7540-B70C-1DC85CD86FD6}"/>
               </a:ext>
             </a:extLst>
-          </p:spPr>
-        </p:pic>
-        <p:pic>
-          <p:nvPicPr>
-            <p:cNvPr id="9" name="Picture 2" descr="ub"/>
-            <p:cNvPicPr>
-              <a:picLocks noChangeAspect="1" noChangeArrowheads="1"/>
-            </p:cNvPicPr>
-            <p:nvPr/>
-          </p:nvPicPr>
-          <p:blipFill rotWithShape="1">
-            <a:blip r:embed="rId2">
-              <a:extLst>
-                <a:ext uri="{28A0092B-C50C-407E-A947-70E740481C1C}">
-                  <a14:useLocalDpi xmlns:a14="http://schemas.microsoft.com/office/drawing/2010/main" val="0"/>
-                </a:ext>
-              </a:extLst>
-            </a:blip>
-            <a:srcRect l="70653" t="667" r="15489" b="50334"/>
-            <a:stretch/>
-          </p:blipFill>
-          <p:spPr bwMode="auto">
-            <a:xfrm>
-              <a:off x="9233574" y="3311007"/>
-              <a:ext cx="1134737" cy="1289604"/>
-            </a:xfrm>
-            <a:prstGeom prst="rect">
-              <a:avLst/>
-            </a:prstGeom>
-            <a:noFill/>
+          </p:cNvPr>
+          <p:cNvSpPr txBox="1"/>
+          <p:nvPr/>
+        </p:nvSpPr>
+        <p:spPr>
+          <a:xfrm>
+            <a:off x="7103230" y="2487527"/>
+            <a:ext cx="1751681" cy="523220"/>
+          </a:xfrm>
+          <a:prstGeom prst="rect">
+            <a:avLst/>
+          </a:prstGeom>
+          <a:noFill/>
+        </p:spPr>
+        <p:txBody>
+          <a:bodyPr wrap="square" rtlCol="0">
+            <a:spAutoFit/>
+          </a:bodyPr>
+          <a:lstStyle/>
+          <a:p>
+            <a:r>
+              <a:rPr lang="en-US" sz="1400" dirty="0">
+                <a:latin typeface="Proxima Nova" panose="02000506030000020004" pitchFamily="2" charset="0"/>
+              </a:rPr>
+              <a:t>59 Habitats</a:t>
+            </a:r>
+          </a:p>
+          <a:p>
+            <a:r>
+              <a:rPr lang="en-US" sz="1400" dirty="0">
+                <a:latin typeface="Proxima Nova" panose="02000506030000020004" pitchFamily="2" charset="0"/>
+              </a:rPr>
+              <a:t>77 Species</a:t>
+            </a:r>
+          </a:p>
+        </p:txBody>
+      </p:sp>
+      <p:sp>
+        <p:nvSpPr>
+          <p:cNvPr id="19" name="TextBox 18">
             <a:extLst>
-              <a:ext uri="{909E8E84-426E-40DD-AFC4-6F175D3DCCD1}">
-                <a14:hiddenFill xmlns:a14="http://schemas.microsoft.com/office/drawing/2010/main">
-                  <a:solidFill>
-                    <a:srgbClr val="FFFFFF"/>
-                  </a:solidFill>
-                </a14:hiddenFill>
+              <a:ext uri="{FF2B5EF4-FFF2-40B4-BE49-F238E27FC236}">
+                <a16:creationId xmlns:a16="http://schemas.microsoft.com/office/drawing/2014/main" id="{B956DB1B-4A84-C14C-84A0-91F8E95D3C43}"/>
               </a:ext>
             </a:extLst>
-          </p:spPr>
-        </p:pic>
-        <p:pic>
-          <p:nvPicPr>
-            <p:cNvPr id="10" name="Picture 2" descr="ub"/>
-            <p:cNvPicPr>
-              <a:picLocks noChangeAspect="1" noChangeArrowheads="1"/>
-            </p:cNvPicPr>
-            <p:nvPr/>
-          </p:nvPicPr>
-          <p:blipFill rotWithShape="1">
-            <a:blip r:embed="rId2">
-              <a:extLst>
-                <a:ext uri="{28A0092B-C50C-407E-A947-70E740481C1C}">
-                  <a14:useLocalDpi xmlns:a14="http://schemas.microsoft.com/office/drawing/2010/main" val="0"/>
-                </a:ext>
-              </a:extLst>
-            </a:blip>
-            <a:srcRect l="57759" t="48074" r="27845" b="2893"/>
-            <a:stretch/>
-          </p:blipFill>
-          <p:spPr bwMode="auto">
-            <a:xfrm>
-              <a:off x="6103344" y="1796892"/>
-              <a:ext cx="1178805" cy="1290501"/>
-            </a:xfrm>
-            <a:prstGeom prst="rect">
-              <a:avLst/>
-            </a:prstGeom>
-            <a:noFill/>
+          </p:cNvPr>
+          <p:cNvSpPr txBox="1"/>
+          <p:nvPr/>
+        </p:nvSpPr>
+        <p:spPr>
+          <a:xfrm>
+            <a:off x="7103230" y="3722056"/>
+            <a:ext cx="1751681" cy="523220"/>
+          </a:xfrm>
+          <a:prstGeom prst="rect">
+            <a:avLst/>
+          </a:prstGeom>
+          <a:noFill/>
+        </p:spPr>
+        <p:txBody>
+          <a:bodyPr wrap="square" rtlCol="0">
+            <a:spAutoFit/>
+          </a:bodyPr>
+          <a:lstStyle/>
+          <a:p>
+            <a:r>
+              <a:rPr lang="en-US" sz="1400" dirty="0">
+                <a:latin typeface="Proxima Nova" panose="02000506030000020004" pitchFamily="2" charset="0"/>
+              </a:rPr>
+              <a:t>92 Livelihoods</a:t>
+            </a:r>
+          </a:p>
+          <a:p>
+            <a:r>
+              <a:rPr lang="en-US" sz="1400" dirty="0">
+                <a:latin typeface="Proxima Nova" panose="02000506030000020004" pitchFamily="2" charset="0"/>
+              </a:rPr>
+              <a:t>92 Economies</a:t>
+            </a:r>
+          </a:p>
+        </p:txBody>
+      </p:sp>
+      <p:sp>
+        <p:nvSpPr>
+          <p:cNvPr id="20" name="TextBox 19">
             <a:extLst>
-              <a:ext uri="{909E8E84-426E-40DD-AFC4-6F175D3DCCD1}">
-                <a14:hiddenFill xmlns:a14="http://schemas.microsoft.com/office/drawing/2010/main">
-                  <a:solidFill>
-                    <a:srgbClr val="FFFFFF"/>
-                  </a:solidFill>
-                </a14:hiddenFill>
+              <a:ext uri="{FF2B5EF4-FFF2-40B4-BE49-F238E27FC236}">
+                <a16:creationId xmlns:a16="http://schemas.microsoft.com/office/drawing/2014/main" id="{E628F493-005D-4546-B512-985B40B6350D}"/>
               </a:ext>
             </a:extLst>
-          </p:spPr>
-        </p:pic>
-        <p:pic>
-          <p:nvPicPr>
-            <p:cNvPr id="11" name="Picture 2" descr="ub"/>
-            <p:cNvPicPr>
-              <a:picLocks noChangeAspect="1" noChangeArrowheads="1"/>
-            </p:cNvPicPr>
-            <p:nvPr/>
-          </p:nvPicPr>
-          <p:blipFill rotWithShape="1">
-            <a:blip r:embed="rId2">
-              <a:extLst>
-                <a:ext uri="{28A0092B-C50C-407E-A947-70E740481C1C}">
-                  <a14:useLocalDpi xmlns:a14="http://schemas.microsoft.com/office/drawing/2010/main" val="0"/>
-                </a:ext>
-              </a:extLst>
-            </a:blip>
-            <a:srcRect l="43385" t="47915" r="41815" b="7277"/>
-            <a:stretch/>
-          </p:blipFill>
-          <p:spPr bwMode="auto">
-            <a:xfrm>
-              <a:off x="9270692" y="481340"/>
-              <a:ext cx="1211855" cy="1179319"/>
-            </a:xfrm>
-            <a:prstGeom prst="rect">
-              <a:avLst/>
-            </a:prstGeom>
-            <a:noFill/>
+          </p:cNvPr>
+          <p:cNvSpPr txBox="1"/>
+          <p:nvPr/>
+        </p:nvSpPr>
+        <p:spPr>
+          <a:xfrm>
+            <a:off x="7103230" y="5081387"/>
+            <a:ext cx="2369383" cy="523220"/>
+          </a:xfrm>
+          <a:prstGeom prst="rect">
+            <a:avLst/>
+          </a:prstGeom>
+          <a:noFill/>
+        </p:spPr>
+        <p:txBody>
+          <a:bodyPr wrap="square" rtlCol="0">
+            <a:spAutoFit/>
+          </a:bodyPr>
+          <a:lstStyle/>
+          <a:p>
+            <a:r>
+              <a:rPr lang="en-US" sz="1400" dirty="0">
+                <a:latin typeface="Proxima Nova" panose="02000506030000020004" pitchFamily="2" charset="0"/>
+              </a:rPr>
+              <a:t>64 Lasting Special Places</a:t>
+            </a:r>
+          </a:p>
+          <a:p>
+            <a:r>
+              <a:rPr lang="en-US" sz="1400" dirty="0">
+                <a:latin typeface="Proxima Nova" panose="02000506030000020004" pitchFamily="2" charset="0"/>
+              </a:rPr>
+              <a:t>88 Connection to Place</a:t>
+            </a:r>
+          </a:p>
+        </p:txBody>
+      </p:sp>
+      <p:sp>
+        <p:nvSpPr>
+          <p:cNvPr id="21" name="TextBox 20">
             <a:extLst>
-              <a:ext uri="{909E8E84-426E-40DD-AFC4-6F175D3DCCD1}">
-                <a14:hiddenFill xmlns:a14="http://schemas.microsoft.com/office/drawing/2010/main">
-                  <a:solidFill>
-                    <a:srgbClr val="FFFFFF"/>
-                  </a:solidFill>
-                </a14:hiddenFill>
+              <a:ext uri="{FF2B5EF4-FFF2-40B4-BE49-F238E27FC236}">
+                <a16:creationId xmlns:a16="http://schemas.microsoft.com/office/drawing/2014/main" id="{2142F039-DA23-804C-8E4F-AC14BD6008B8}"/>
               </a:ext>
             </a:extLst>
-          </p:spPr>
-        </p:pic>
-        <p:pic>
-          <p:nvPicPr>
-            <p:cNvPr id="4" name="Picture 3"/>
-            <p:cNvPicPr>
-              <a:picLocks noChangeAspect="1"/>
-            </p:cNvPicPr>
-            <p:nvPr/>
-          </p:nvPicPr>
-          <p:blipFill rotWithShape="1">
-            <a:blip r:embed="rId3">
-              <a:extLst>
-                <a:ext uri="{28A0092B-C50C-407E-A947-70E740481C1C}">
-                  <a14:useLocalDpi xmlns:a14="http://schemas.microsoft.com/office/drawing/2010/main" val="0"/>
-                </a:ext>
-              </a:extLst>
-            </a:blip>
-            <a:srcRect l="13885" t="17242" r="23969" b="8149"/>
-            <a:stretch/>
-          </p:blipFill>
-          <p:spPr>
-            <a:xfrm>
-              <a:off x="31901" y="0"/>
-              <a:ext cx="6005343" cy="5407254"/>
-            </a:xfrm>
-            <a:prstGeom prst="rect">
-              <a:avLst/>
-            </a:prstGeom>
-          </p:spPr>
-        </p:pic>
-        <p:pic>
-          <p:nvPicPr>
-            <p:cNvPr id="13" name="Picture 12"/>
-            <p:cNvPicPr>
-              <a:picLocks noChangeAspect="1"/>
-            </p:cNvPicPr>
-            <p:nvPr/>
-          </p:nvPicPr>
-          <p:blipFill rotWithShape="1">
-            <a:blip r:embed="rId3">
-              <a:extLst>
-                <a:ext uri="{28A0092B-C50C-407E-A947-70E740481C1C}">
-                  <a14:useLocalDpi xmlns:a14="http://schemas.microsoft.com/office/drawing/2010/main" val="0"/>
-                </a:ext>
-              </a:extLst>
-            </a:blip>
-            <a:srcRect l="79710" t="38064" r="10946" b="33971"/>
-            <a:stretch/>
-          </p:blipFill>
-          <p:spPr>
-            <a:xfrm>
-              <a:off x="456264" y="5117892"/>
-              <a:ext cx="738491" cy="1657689"/>
-            </a:xfrm>
-            <a:prstGeom prst="rect">
-              <a:avLst/>
-            </a:prstGeom>
-          </p:spPr>
-        </p:pic>
-        <p:sp>
-          <p:nvSpPr>
-            <p:cNvPr id="12" name="TextBox 11"/>
-            <p:cNvSpPr txBox="1"/>
-            <p:nvPr/>
-          </p:nvSpPr>
-          <p:spPr>
-            <a:xfrm>
-              <a:off x="1260857" y="5491253"/>
-              <a:ext cx="3679634" cy="1200329"/>
-            </a:xfrm>
-            <a:prstGeom prst="rect">
-              <a:avLst/>
-            </a:prstGeom>
-            <a:noFill/>
-          </p:spPr>
-          <p:txBody>
-            <a:bodyPr wrap="square" rtlCol="0">
-              <a:spAutoFit/>
-            </a:bodyPr>
-            <a:lstStyle/>
-            <a:p>
-              <a:r>
-                <a:rPr lang="en-US" dirty="0" smtClean="0"/>
-                <a:t>Scores are from 0 to 100 and reflect the ability of our ocean to provide sustainable benefits to Hawaii now and into the future</a:t>
-              </a:r>
-              <a:endParaRPr lang="en-US" dirty="0"/>
-            </a:p>
-          </p:txBody>
-        </p:sp>
-        <p:sp>
-          <p:nvSpPr>
-            <p:cNvPr id="14" name="TextBox 13"/>
-            <p:cNvSpPr txBox="1"/>
-            <p:nvPr/>
-          </p:nvSpPr>
-          <p:spPr>
-            <a:xfrm>
-              <a:off x="7282149" y="651130"/>
-              <a:ext cx="1751681" cy="738664"/>
-            </a:xfrm>
-            <a:prstGeom prst="rect">
-              <a:avLst/>
-            </a:prstGeom>
-            <a:noFill/>
-          </p:spPr>
-          <p:txBody>
-            <a:bodyPr wrap="square" rtlCol="0">
-              <a:spAutoFit/>
-            </a:bodyPr>
-            <a:lstStyle/>
-            <a:p>
-              <a:r>
-                <a:rPr lang="en-US" sz="1400" b="1" dirty="0" smtClean="0">
-                  <a:solidFill>
-                    <a:schemeClr val="accent1"/>
-                  </a:solidFill>
-                </a:rPr>
-                <a:t>85</a:t>
-              </a:r>
-              <a:r>
-                <a:rPr lang="en-US" sz="1400" dirty="0" smtClean="0"/>
-                <a:t> wild caught fisheries </a:t>
-              </a:r>
-            </a:p>
-            <a:p>
-              <a:r>
-                <a:rPr lang="en-US" sz="1400" b="1" dirty="0" smtClean="0">
-                  <a:solidFill>
-                    <a:schemeClr val="accent2">
-                      <a:lumMod val="60000"/>
-                      <a:lumOff val="40000"/>
-                    </a:schemeClr>
-                  </a:solidFill>
-                </a:rPr>
-                <a:t>46 </a:t>
-              </a:r>
-              <a:r>
-                <a:rPr lang="en-US" sz="1400" dirty="0" err="1" smtClean="0"/>
-                <a:t>mariculture</a:t>
-              </a:r>
-              <a:endParaRPr lang="en-US" sz="1400" dirty="0"/>
-            </a:p>
-          </p:txBody>
-        </p:sp>
-        <p:sp>
-          <p:nvSpPr>
-            <p:cNvPr id="16" name="TextBox 15"/>
-            <p:cNvSpPr txBox="1"/>
-            <p:nvPr/>
-          </p:nvSpPr>
-          <p:spPr>
-            <a:xfrm>
-              <a:off x="7744858" y="4902506"/>
-              <a:ext cx="3084723" cy="646331"/>
-            </a:xfrm>
-            <a:prstGeom prst="rect">
-              <a:avLst/>
-            </a:prstGeom>
-            <a:noFill/>
-          </p:spPr>
-          <p:txBody>
-            <a:bodyPr wrap="square" rtlCol="0">
-              <a:spAutoFit/>
-            </a:bodyPr>
-            <a:lstStyle/>
-            <a:p>
-              <a:r>
-                <a:rPr lang="en-US" dirty="0" smtClean="0"/>
-                <a:t>Text for scores or major messages here</a:t>
-              </a:r>
-              <a:endParaRPr lang="en-US" dirty="0"/>
-            </a:p>
-          </p:txBody>
-        </p:sp>
-      </p:grpSp>
+          </p:cNvPr>
+          <p:cNvSpPr txBox="1"/>
+          <p:nvPr/>
+        </p:nvSpPr>
+        <p:spPr>
+          <a:xfrm>
+            <a:off x="10166154" y="967518"/>
+            <a:ext cx="1988543" cy="523220"/>
+          </a:xfrm>
+          <a:prstGeom prst="rect">
+            <a:avLst/>
+          </a:prstGeom>
+          <a:noFill/>
+        </p:spPr>
+        <p:txBody>
+          <a:bodyPr wrap="square" rtlCol="0">
+            <a:spAutoFit/>
+          </a:bodyPr>
+          <a:lstStyle/>
+          <a:p>
+            <a:r>
+              <a:rPr lang="en-US" sz="1400" dirty="0">
+                <a:latin typeface="Proxima Nova" panose="02000506030000020004" pitchFamily="2" charset="0"/>
+              </a:rPr>
+              <a:t>79 Artisan Fishing Opportunities</a:t>
+            </a:r>
+          </a:p>
+        </p:txBody>
+      </p:sp>
+      <p:sp>
+        <p:nvSpPr>
+          <p:cNvPr id="22" name="TextBox 21">
+            <a:extLst>
+              <a:ext uri="{FF2B5EF4-FFF2-40B4-BE49-F238E27FC236}">
+                <a16:creationId xmlns:a16="http://schemas.microsoft.com/office/drawing/2014/main" id="{27501FBC-F27A-2844-92F0-B93A6A5DD5AA}"/>
+              </a:ext>
+            </a:extLst>
+          </p:cNvPr>
+          <p:cNvSpPr txBox="1"/>
+          <p:nvPr/>
+        </p:nvSpPr>
+        <p:spPr>
+          <a:xfrm>
+            <a:off x="10166154" y="2487527"/>
+            <a:ext cx="1751681" cy="523220"/>
+          </a:xfrm>
+          <a:prstGeom prst="rect">
+            <a:avLst/>
+          </a:prstGeom>
+          <a:noFill/>
+        </p:spPr>
+        <p:txBody>
+          <a:bodyPr wrap="square" rtlCol="0">
+            <a:spAutoFit/>
+          </a:bodyPr>
+          <a:lstStyle/>
+          <a:p>
+            <a:r>
+              <a:rPr lang="en-US" sz="1400" dirty="0">
+                <a:latin typeface="Proxima Nova" panose="02000506030000020004" pitchFamily="2" charset="0"/>
+              </a:rPr>
+              <a:t>49 Coastal Protection</a:t>
+            </a:r>
+          </a:p>
+        </p:txBody>
+      </p:sp>
+      <p:sp>
+        <p:nvSpPr>
+          <p:cNvPr id="23" name="TextBox 22">
+            <a:extLst>
+              <a:ext uri="{FF2B5EF4-FFF2-40B4-BE49-F238E27FC236}">
+                <a16:creationId xmlns:a16="http://schemas.microsoft.com/office/drawing/2014/main" id="{62B186FD-5E26-8247-8FE9-91D7C77BFD0B}"/>
+              </a:ext>
+            </a:extLst>
+          </p:cNvPr>
+          <p:cNvSpPr txBox="1"/>
+          <p:nvPr/>
+        </p:nvSpPr>
+        <p:spPr>
+          <a:xfrm>
+            <a:off x="10166154" y="3722056"/>
+            <a:ext cx="1751681" cy="523220"/>
+          </a:xfrm>
+          <a:prstGeom prst="rect">
+            <a:avLst/>
+          </a:prstGeom>
+          <a:noFill/>
+        </p:spPr>
+        <p:txBody>
+          <a:bodyPr wrap="square" rtlCol="0">
+            <a:spAutoFit/>
+          </a:bodyPr>
+          <a:lstStyle/>
+          <a:p>
+            <a:r>
+              <a:rPr lang="en-US" sz="1400" dirty="0">
+                <a:latin typeface="Proxima Nova" panose="02000506030000020004" pitchFamily="2" charset="0"/>
+              </a:rPr>
+              <a:t>58 Sustainable Tourism</a:t>
+            </a:r>
+          </a:p>
+        </p:txBody>
+      </p:sp>
+      <p:pic>
+        <p:nvPicPr>
+          <p:cNvPr id="24" name="Picture 23">
+            <a:extLst>
+              <a:ext uri="{FF2B5EF4-FFF2-40B4-BE49-F238E27FC236}">
+                <a16:creationId xmlns:a16="http://schemas.microsoft.com/office/drawing/2014/main" id="{60464EEA-612B-6542-8544-D1B253520D6F}"/>
+              </a:ext>
+            </a:extLst>
+          </p:cNvPr>
+          <p:cNvPicPr/>
+          <p:nvPr/>
+        </p:nvPicPr>
+        <p:blipFill>
+          <a:blip r:embed="rId4">
+            <a:extLst>
+              <a:ext uri="{28A0092B-C50C-407E-A947-70E740481C1C}">
+                <a14:useLocalDpi xmlns:a14="http://schemas.microsoft.com/office/drawing/2010/main" val="0"/>
+              </a:ext>
+            </a:extLst>
+          </a:blip>
+          <a:stretch>
+            <a:fillRect/>
+          </a:stretch>
+        </p:blipFill>
+        <p:spPr>
+          <a:xfrm>
+            <a:off x="5982668" y="724127"/>
+            <a:ext cx="937588" cy="937588"/>
+          </a:xfrm>
+          <a:prstGeom prst="rect">
+            <a:avLst/>
+          </a:prstGeom>
+        </p:spPr>
+      </p:pic>
+      <p:pic>
+        <p:nvPicPr>
+          <p:cNvPr id="25" name="Picture 24">
+            <a:extLst>
+              <a:ext uri="{FF2B5EF4-FFF2-40B4-BE49-F238E27FC236}">
+                <a16:creationId xmlns:a16="http://schemas.microsoft.com/office/drawing/2014/main" id="{5906209C-7109-9C42-99B0-414EC4140034}"/>
+              </a:ext>
+            </a:extLst>
+          </p:cNvPr>
+          <p:cNvPicPr>
+            <a:picLocks noChangeAspect="1"/>
+          </p:cNvPicPr>
+          <p:nvPr/>
+        </p:nvPicPr>
+        <p:blipFill>
+          <a:blip r:embed="rId5">
+            <a:extLst>
+              <a:ext uri="{28A0092B-C50C-407E-A947-70E740481C1C}">
+                <a14:useLocalDpi xmlns:a14="http://schemas.microsoft.com/office/drawing/2010/main" val="0"/>
+              </a:ext>
+            </a:extLst>
+          </a:blip>
+          <a:stretch>
+            <a:fillRect/>
+          </a:stretch>
+        </p:blipFill>
+        <p:spPr>
+          <a:xfrm>
+            <a:off x="9134637" y="724127"/>
+            <a:ext cx="936492" cy="936492"/>
+          </a:xfrm>
+          <a:prstGeom prst="rect">
+            <a:avLst/>
+          </a:prstGeom>
+        </p:spPr>
+      </p:pic>
+      <p:pic>
+        <p:nvPicPr>
+          <p:cNvPr id="26" name="Picture 25">
+            <a:extLst>
+              <a:ext uri="{FF2B5EF4-FFF2-40B4-BE49-F238E27FC236}">
+                <a16:creationId xmlns:a16="http://schemas.microsoft.com/office/drawing/2014/main" id="{4CF49A61-B2AA-9E49-94B1-9C717C268639}"/>
+              </a:ext>
+            </a:extLst>
+          </p:cNvPr>
+          <p:cNvPicPr>
+            <a:picLocks noChangeAspect="1"/>
+          </p:cNvPicPr>
+          <p:nvPr/>
+        </p:nvPicPr>
+        <p:blipFill>
+          <a:blip r:embed="rId6">
+            <a:extLst>
+              <a:ext uri="{28A0092B-C50C-407E-A947-70E740481C1C}">
+                <a14:useLocalDpi xmlns:a14="http://schemas.microsoft.com/office/drawing/2010/main" val="0"/>
+              </a:ext>
+            </a:extLst>
+          </a:blip>
+          <a:stretch>
+            <a:fillRect/>
+          </a:stretch>
+        </p:blipFill>
+        <p:spPr>
+          <a:xfrm>
+            <a:off x="5982668" y="4791500"/>
+            <a:ext cx="954633" cy="954633"/>
+          </a:xfrm>
+          <a:prstGeom prst="rect">
+            <a:avLst/>
+          </a:prstGeom>
+        </p:spPr>
+      </p:pic>
+      <p:pic>
+        <p:nvPicPr>
+          <p:cNvPr id="27" name="Picture 26">
+            <a:extLst>
+              <a:ext uri="{FF2B5EF4-FFF2-40B4-BE49-F238E27FC236}">
+                <a16:creationId xmlns:a16="http://schemas.microsoft.com/office/drawing/2014/main" id="{FAE02C5A-16EA-4E40-A57A-32C7F5436346}"/>
+              </a:ext>
+            </a:extLst>
+          </p:cNvPr>
+          <p:cNvPicPr>
+            <a:picLocks noChangeAspect="1"/>
+          </p:cNvPicPr>
+          <p:nvPr/>
+        </p:nvPicPr>
+        <p:blipFill>
+          <a:blip r:embed="rId7">
+            <a:extLst>
+              <a:ext uri="{28A0092B-C50C-407E-A947-70E740481C1C}">
+                <a14:useLocalDpi xmlns:a14="http://schemas.microsoft.com/office/drawing/2010/main" val="0"/>
+              </a:ext>
+            </a:extLst>
+          </a:blip>
+          <a:stretch>
+            <a:fillRect/>
+          </a:stretch>
+        </p:blipFill>
+        <p:spPr>
+          <a:xfrm>
+            <a:off x="9134637" y="3504139"/>
+            <a:ext cx="924490" cy="930653"/>
+          </a:xfrm>
+          <a:prstGeom prst="rect">
+            <a:avLst/>
+          </a:prstGeom>
+        </p:spPr>
+      </p:pic>
+      <p:pic>
+        <p:nvPicPr>
+          <p:cNvPr id="28" name="Picture 27">
+            <a:extLst>
+              <a:ext uri="{FF2B5EF4-FFF2-40B4-BE49-F238E27FC236}">
+                <a16:creationId xmlns:a16="http://schemas.microsoft.com/office/drawing/2014/main" id="{4FF76E5E-F92C-9945-A458-EBB778A6D448}"/>
+              </a:ext>
+            </a:extLst>
+          </p:cNvPr>
+          <p:cNvPicPr>
+            <a:picLocks noChangeAspect="1"/>
+          </p:cNvPicPr>
+          <p:nvPr/>
+        </p:nvPicPr>
+        <p:blipFill>
+          <a:blip r:embed="rId8">
+            <a:extLst>
+              <a:ext uri="{28A0092B-C50C-407E-A947-70E740481C1C}">
+                <a14:useLocalDpi xmlns:a14="http://schemas.microsoft.com/office/drawing/2010/main" val="0"/>
+              </a:ext>
+            </a:extLst>
+          </a:blip>
+          <a:stretch>
+            <a:fillRect/>
+          </a:stretch>
+        </p:blipFill>
+        <p:spPr>
+          <a:xfrm>
+            <a:off x="5982668" y="2167038"/>
+            <a:ext cx="935974" cy="929817"/>
+          </a:xfrm>
+          <a:prstGeom prst="rect">
+            <a:avLst/>
+          </a:prstGeom>
+        </p:spPr>
+      </p:pic>
+      <p:pic>
+        <p:nvPicPr>
+          <p:cNvPr id="29" name="Picture 28">
+            <a:extLst>
+              <a:ext uri="{FF2B5EF4-FFF2-40B4-BE49-F238E27FC236}">
+                <a16:creationId xmlns:a16="http://schemas.microsoft.com/office/drawing/2014/main" id="{43D804BD-5EBD-4849-A886-746B266819E2}"/>
+              </a:ext>
+            </a:extLst>
+          </p:cNvPr>
+          <p:cNvPicPr>
+            <a:picLocks noChangeAspect="1"/>
+          </p:cNvPicPr>
+          <p:nvPr/>
+        </p:nvPicPr>
+        <p:blipFill>
+          <a:blip r:embed="rId9">
+            <a:extLst>
+              <a:ext uri="{28A0092B-C50C-407E-A947-70E740481C1C}">
+                <a14:useLocalDpi xmlns:a14="http://schemas.microsoft.com/office/drawing/2010/main" val="0"/>
+              </a:ext>
+            </a:extLst>
+          </a:blip>
+          <a:stretch>
+            <a:fillRect/>
+          </a:stretch>
+        </p:blipFill>
+        <p:spPr>
+          <a:xfrm>
+            <a:off x="9134637" y="2167038"/>
+            <a:ext cx="916865" cy="916865"/>
+          </a:xfrm>
+          <a:prstGeom prst="rect">
+            <a:avLst/>
+          </a:prstGeom>
+        </p:spPr>
+      </p:pic>
+      <p:pic>
+        <p:nvPicPr>
+          <p:cNvPr id="30" name="Picture 29">
+            <a:extLst>
+              <a:ext uri="{FF2B5EF4-FFF2-40B4-BE49-F238E27FC236}">
+                <a16:creationId xmlns:a16="http://schemas.microsoft.com/office/drawing/2014/main" id="{6B3F2E07-A856-1642-B4D5-FA934AE22F05}"/>
+              </a:ext>
+            </a:extLst>
+          </p:cNvPr>
+          <p:cNvPicPr>
+            <a:picLocks noChangeAspect="1"/>
+          </p:cNvPicPr>
+          <p:nvPr/>
+        </p:nvPicPr>
+        <p:blipFill>
+          <a:blip r:embed="rId10">
+            <a:extLst>
+              <a:ext uri="{28A0092B-C50C-407E-A947-70E740481C1C}">
+                <a14:useLocalDpi xmlns:a14="http://schemas.microsoft.com/office/drawing/2010/main" val="0"/>
+              </a:ext>
+            </a:extLst>
+          </a:blip>
+          <a:stretch>
+            <a:fillRect/>
+          </a:stretch>
+        </p:blipFill>
+        <p:spPr>
+          <a:xfrm>
+            <a:off x="5982668" y="3504139"/>
+            <a:ext cx="930820" cy="930820"/>
+          </a:xfrm>
+          <a:prstGeom prst="rect">
+            <a:avLst/>
+          </a:prstGeom>
+        </p:spPr>
+      </p:pic>
     </p:spTree>
     <p:extLst>
       <p:ext uri="{BB962C8B-B14F-4D97-AF65-F5344CB8AC3E}">
@@ -3798,7 +4026,7 @@
 </p:sld>
 </file>
 
-<file path=ppt/slides/slide2.xml><?xml version="1.0" encoding="utf-8"?>
+<file path=ppt/slides/slide4.xml><?xml version="1.0" encoding="utf-8"?>
 <p:sld xmlns:a="http://schemas.openxmlformats.org/drawingml/2006/main" xmlns:r="http://schemas.openxmlformats.org/officeDocument/2006/relationships" xmlns:p="http://schemas.openxmlformats.org/presentationml/2006/main">
   <p:cSld>
     <p:spTree>
@@ -4187,18 +4415,13 @@
             <a:p>
               <a:pPr algn="ctr"/>
               <a:r>
-                <a:rPr lang="en-US" sz="3200" dirty="0" smtClean="0">
+                <a:rPr lang="en-US" sz="3200" dirty="0">
                   <a:solidFill>
                     <a:schemeClr val="bg1"/>
                   </a:solidFill>
                 </a:rPr>
                 <a:t>87</a:t>
               </a:r>
-              <a:endParaRPr lang="en-US" sz="3200" dirty="0">
-                <a:solidFill>
-                  <a:schemeClr val="bg1"/>
-                </a:solidFill>
-              </a:endParaRPr>
             </a:p>
           </p:txBody>
         </p:sp>
@@ -4216,7 +4439,7 @@
 </p:sld>
 </file>
 
-<file path=ppt/slides/slide3.xml><?xml version="1.0" encoding="utf-8"?>
+<file path=ppt/slides/slide5.xml><?xml version="1.0" encoding="utf-8"?>
 <p:sld xmlns:a="http://schemas.openxmlformats.org/drawingml/2006/main" xmlns:r="http://schemas.openxmlformats.org/officeDocument/2006/relationships" xmlns:p="http://schemas.openxmlformats.org/presentationml/2006/main">
   <p:cSld>
     <p:spTree>
@@ -4467,13 +4690,55 @@
           <a:p>
             <a:pPr algn="ctr"/>
             <a:r>
-              <a:rPr lang="en-US" sz="2000" b="1" dirty="0" smtClean="0">
+              <a:rPr lang="en-US" sz="2000" b="1" dirty="0">
                 <a:latin typeface="Times New Roman" charset="0"/>
                 <a:ea typeface="Times New Roman" charset="0"/>
                 <a:cs typeface="Times New Roman" charset="0"/>
               </a:rPr>
               <a:t>Food Provision</a:t>
             </a:r>
+          </a:p>
+        </p:txBody>
+      </p:sp>
+      <p:sp>
+        <p:nvSpPr>
+          <p:cNvPr id="11" name="TextBox 10"/>
+          <p:cNvSpPr txBox="1"/>
+          <p:nvPr/>
+        </p:nvSpPr>
+        <p:spPr>
+          <a:xfrm>
+            <a:off x="1504953" y="2812141"/>
+            <a:ext cx="2038365" cy="1015663"/>
+          </a:xfrm>
+          <a:prstGeom prst="rect">
+            <a:avLst/>
+          </a:prstGeom>
+          <a:noFill/>
+        </p:spPr>
+        <p:txBody>
+          <a:bodyPr wrap="square" rtlCol="0">
+            <a:spAutoFit/>
+          </a:bodyPr>
+          <a:lstStyle/>
+          <a:p>
+            <a:pPr algn="ctr"/>
+            <a:r>
+              <a:rPr lang="en-US" sz="2000" b="1" dirty="0">
+                <a:latin typeface="Times New Roman" charset="0"/>
+                <a:ea typeface="Times New Roman" charset="0"/>
+                <a:cs typeface="Times New Roman" charset="0"/>
+              </a:rPr>
+              <a:t>Artisanal </a:t>
+            </a:r>
+            <a:r>
+              <a:rPr lang="en-US" sz="2000" b="1">
+                <a:latin typeface="Times New Roman" charset="0"/>
+                <a:ea typeface="Times New Roman" charset="0"/>
+                <a:cs typeface="Times New Roman" charset="0"/>
+              </a:rPr>
+              <a:t>Fishing Opportunities</a:t>
+            </a:r>
             <a:endParaRPr lang="en-US" sz="2000" b="1" dirty="0">
               <a:latin typeface="Times New Roman" charset="0"/>
               <a:ea typeface="Times New Roman" charset="0"/>
@@ -4484,14 +4749,14 @@
       </p:sp>
       <p:sp>
         <p:nvSpPr>
-          <p:cNvPr id="11" name="TextBox 10"/>
+          <p:cNvPr id="12" name="TextBox 11"/>
           <p:cNvSpPr txBox="1"/>
           <p:nvPr/>
         </p:nvSpPr>
         <p:spPr>
           <a:xfrm>
-            <a:off x="1504953" y="2812141"/>
-            <a:ext cx="2038365" cy="1015663"/>
+            <a:off x="3702961" y="2812140"/>
+            <a:ext cx="1545771" cy="710651"/>
           </a:xfrm>
           <a:prstGeom prst="rect">
             <a:avLst/>
@@ -4506,65 +4771,13 @@
           <a:p>
             <a:pPr algn="ctr"/>
             <a:r>
-              <a:rPr lang="en-US" sz="2000" b="1" dirty="0" smtClean="0">
-                <a:latin typeface="Times New Roman" charset="0"/>
-                <a:ea typeface="Times New Roman" charset="0"/>
-                <a:cs typeface="Times New Roman" charset="0"/>
-              </a:rPr>
-              <a:t>Artisanal </a:t>
-            </a:r>
-            <a:r>
-              <a:rPr lang="en-US" sz="2000" b="1" smtClean="0">
-                <a:latin typeface="Times New Roman" charset="0"/>
-                <a:ea typeface="Times New Roman" charset="0"/>
-                <a:cs typeface="Times New Roman" charset="0"/>
-              </a:rPr>
-              <a:t>Fishing Opportunities</a:t>
-            </a:r>
-            <a:endParaRPr lang="en-US" sz="2000" b="1" dirty="0">
-              <a:latin typeface="Times New Roman" charset="0"/>
-              <a:ea typeface="Times New Roman" charset="0"/>
-              <a:cs typeface="Times New Roman" charset="0"/>
-            </a:endParaRPr>
-          </a:p>
-        </p:txBody>
-      </p:sp>
-      <p:sp>
-        <p:nvSpPr>
-          <p:cNvPr id="12" name="TextBox 11"/>
-          <p:cNvSpPr txBox="1"/>
-          <p:nvPr/>
-        </p:nvSpPr>
-        <p:spPr>
-          <a:xfrm>
-            <a:off x="3702961" y="2812140"/>
-            <a:ext cx="1545771" cy="710651"/>
-          </a:xfrm>
-          <a:prstGeom prst="rect">
-            <a:avLst/>
-          </a:prstGeom>
-          <a:noFill/>
-        </p:spPr>
-        <p:txBody>
-          <a:bodyPr wrap="square" rtlCol="0">
-            <a:spAutoFit/>
-          </a:bodyPr>
-          <a:lstStyle/>
-          <a:p>
-            <a:pPr algn="ctr"/>
-            <a:r>
-              <a:rPr lang="en-US" sz="2000" b="1" dirty="0" smtClean="0">
+              <a:rPr lang="en-US" sz="2000" b="1" dirty="0">
                 <a:latin typeface="Times New Roman" charset="0"/>
                 <a:ea typeface="Times New Roman" charset="0"/>
                 <a:cs typeface="Times New Roman" charset="0"/>
               </a:rPr>
               <a:t>Sense of Place</a:t>
             </a:r>
-            <a:endParaRPr lang="en-US" sz="2000" b="1" dirty="0">
-              <a:latin typeface="Times New Roman" charset="0"/>
-              <a:ea typeface="Times New Roman" charset="0"/>
-              <a:cs typeface="Times New Roman" charset="0"/>
-            </a:endParaRPr>
           </a:p>
         </p:txBody>
       </p:sp>
@@ -4592,18 +4805,13 @@
           <a:p>
             <a:pPr algn="ctr"/>
             <a:r>
-              <a:rPr lang="en-US" sz="2000" b="1" dirty="0" smtClean="0">
+              <a:rPr lang="en-US" sz="2000" b="1" dirty="0">
                 <a:latin typeface="Times New Roman" charset="0"/>
                 <a:ea typeface="Times New Roman" charset="0"/>
                 <a:cs typeface="Times New Roman" charset="0"/>
               </a:rPr>
               <a:t>Sustainable Tourism</a:t>
             </a:r>
-            <a:endParaRPr lang="en-US" sz="2000" b="1" dirty="0">
-              <a:latin typeface="Times New Roman" charset="0"/>
-              <a:ea typeface="Times New Roman" charset="0"/>
-              <a:cs typeface="Times New Roman" charset="0"/>
-            </a:endParaRPr>
           </a:p>
         </p:txBody>
       </p:sp>
@@ -4631,18 +4839,13 @@
           <a:p>
             <a:pPr algn="ctr"/>
             <a:r>
-              <a:rPr lang="en-US" sz="2000" b="1" smtClean="0">
+              <a:rPr lang="en-US" sz="2000" b="1">
                 <a:latin typeface="Times New Roman" charset="0"/>
                 <a:ea typeface="Times New Roman" charset="0"/>
                 <a:cs typeface="Times New Roman" charset="0"/>
               </a:rPr>
               <a:t>Biodiversity</a:t>
             </a:r>
-            <a:endParaRPr lang="en-US" sz="2000" b="1">
-              <a:latin typeface="Times New Roman" charset="0"/>
-              <a:ea typeface="Times New Roman" charset="0"/>
-              <a:cs typeface="Times New Roman" charset="0"/>
-            </a:endParaRPr>
           </a:p>
         </p:txBody>
       </p:sp>
@@ -4670,18 +4873,13 @@
           <a:p>
             <a:pPr algn="ctr"/>
             <a:r>
-              <a:rPr lang="en-US" sz="2000" b="1" dirty="0" smtClean="0">
+              <a:rPr lang="en-US" sz="2000" b="1" dirty="0">
                 <a:latin typeface="Times New Roman" charset="0"/>
                 <a:ea typeface="Times New Roman" charset="0"/>
                 <a:cs typeface="Times New Roman" charset="0"/>
               </a:rPr>
               <a:t>Coastal Protection</a:t>
             </a:r>
-            <a:endParaRPr lang="en-US" sz="2000" b="1" dirty="0">
-              <a:latin typeface="Times New Roman" charset="0"/>
-              <a:ea typeface="Times New Roman" charset="0"/>
-              <a:cs typeface="Times New Roman" charset="0"/>
-            </a:endParaRPr>
           </a:p>
         </p:txBody>
       </p:sp>
@@ -4709,18 +4907,13 @@
           <a:p>
             <a:pPr algn="ctr"/>
             <a:r>
-              <a:rPr lang="en-US" sz="2000" b="1" dirty="0" smtClean="0">
+              <a:rPr lang="en-US" sz="2000" b="1" dirty="0">
                 <a:latin typeface="Times New Roman" charset="0"/>
                 <a:ea typeface="Times New Roman" charset="0"/>
                 <a:cs typeface="Times New Roman" charset="0"/>
               </a:rPr>
               <a:t>Livelihoods &amp; Economies</a:t>
             </a:r>
-            <a:endParaRPr lang="en-US" sz="2000" b="1" dirty="0">
-              <a:latin typeface="Times New Roman" charset="0"/>
-              <a:ea typeface="Times New Roman" charset="0"/>
-              <a:cs typeface="Times New Roman" charset="0"/>
-            </a:endParaRPr>
           </a:p>
         </p:txBody>
       </p:sp>

</xml_diff>